<commit_message>
Ajout du sommaire et du déroulement de la présentation
</commit_message>
<xml_diff>
--- a/Documentation/Présentation/présentation.pptx
+++ b/Documentation/Présentation/présentation.pptx
@@ -6,19 +6,25 @@
   </p:sldMasterIdLst>
   <p:sldIdLst>
     <p:sldId id="256" r:id="rId2"/>
-    <p:sldId id="262" r:id="rId3"/>
-    <p:sldId id="266" r:id="rId4"/>
-    <p:sldId id="258" r:id="rId5"/>
-    <p:sldId id="257" r:id="rId6"/>
-    <p:sldId id="260" r:id="rId7"/>
-    <p:sldId id="263" r:id="rId8"/>
-    <p:sldId id="264" r:id="rId9"/>
-    <p:sldId id="261" r:id="rId10"/>
-    <p:sldId id="265" r:id="rId11"/>
-    <p:sldId id="259" r:id="rId12"/>
-    <p:sldId id="267" r:id="rId13"/>
-    <p:sldId id="268" r:id="rId14"/>
-    <p:sldId id="269" r:id="rId15"/>
+    <p:sldId id="272" r:id="rId3"/>
+    <p:sldId id="273" r:id="rId4"/>
+    <p:sldId id="262" r:id="rId5"/>
+    <p:sldId id="266" r:id="rId6"/>
+    <p:sldId id="270" r:id="rId7"/>
+    <p:sldId id="271" r:id="rId8"/>
+    <p:sldId id="274" r:id="rId9"/>
+    <p:sldId id="258" r:id="rId10"/>
+    <p:sldId id="257" r:id="rId11"/>
+    <p:sldId id="260" r:id="rId12"/>
+    <p:sldId id="263" r:id="rId13"/>
+    <p:sldId id="264" r:id="rId14"/>
+    <p:sldId id="261" r:id="rId15"/>
+    <p:sldId id="265" r:id="rId16"/>
+    <p:sldId id="275" r:id="rId17"/>
+    <p:sldId id="259" r:id="rId18"/>
+    <p:sldId id="267" r:id="rId19"/>
+    <p:sldId id="268" r:id="rId20"/>
+    <p:sldId id="269" r:id="rId21"/>
   </p:sldIdLst>
   <p:sldSz cx="12192000" cy="6858000"/>
   <p:notesSz cx="6858000" cy="9144000"/>
@@ -4285,7 +4291,7 @@
           <a:p>
             <a:r>
               <a:rPr lang="fr-FR" dirty="0"/>
-              <a:t>TPI</a:t>
+              <a:t>TPI - Gestion de cave</a:t>
             </a:r>
           </a:p>
         </p:txBody>
@@ -4309,15 +4315,9 @@
         <p:spPr/>
         <p:txBody>
           <a:bodyPr>
-            <a:normAutofit fontScale="92500" lnSpcReduction="10000"/>
+            <a:normAutofit/>
           </a:bodyPr>
           <a:lstStyle/>
-          <a:p>
-            <a:r>
-              <a:rPr lang="fr-FR" dirty="0"/>
-              <a:t>Gestion de cave</a:t>
-            </a:r>
-          </a:p>
           <a:p>
             <a:r>
               <a:rPr lang="fr-FR" sz="1800" dirty="0"/>
@@ -4372,7 +4372,7 @@
           <p:cNvPr id="2" name="Titre 1">
             <a:extLst>
               <a:ext uri="{FF2B5EF4-FFF2-40B4-BE49-F238E27FC236}">
-                <a16:creationId xmlns:a16="http://schemas.microsoft.com/office/drawing/2014/main" id="{9B8AD4FD-586B-BE4F-998B-B7E4791A1369}"/>
+                <a16:creationId xmlns:a16="http://schemas.microsoft.com/office/drawing/2014/main" id="{20C5F73D-F677-7341-8DE8-52EF740466AA}"/>
               </a:ext>
             </a:extLst>
           </p:cNvPr>
@@ -4388,45 +4388,159 @@
           <a:bodyPr/>
           <a:lstStyle/>
           <a:p>
-            <a:endParaRPr lang="fr-FR"/>
-          </a:p>
-        </p:txBody>
-      </p:sp>
-      <p:pic>
-        <p:nvPicPr>
-          <p:cNvPr id="5" name="Espace réservé du contenu 4">
+            <a:r>
+              <a:rPr lang="fr-FR" dirty="0"/>
+              <a:t>Mise en production </a:t>
+            </a:r>
+          </a:p>
+        </p:txBody>
+      </p:sp>
+      <p:sp>
+        <p:nvSpPr>
+          <p:cNvPr id="3" name="Espace réservé du contenu 2">
             <a:extLst>
               <a:ext uri="{FF2B5EF4-FFF2-40B4-BE49-F238E27FC236}">
-                <a16:creationId xmlns:a16="http://schemas.microsoft.com/office/drawing/2014/main" id="{A15FD77F-FB94-9647-B51F-9460DAB4FAFA}"/>
+                <a16:creationId xmlns:a16="http://schemas.microsoft.com/office/drawing/2014/main" id="{E76336E2-2F50-3E45-B944-ABFC072AD902}"/>
               </a:ext>
             </a:extLst>
           </p:cNvPr>
-          <p:cNvPicPr>
-            <a:picLocks noGrp="1" noChangeAspect="1"/>
-          </p:cNvPicPr>
+          <p:cNvSpPr>
+            <a:spLocks noGrp="1"/>
+          </p:cNvSpPr>
           <p:nvPr>
             <p:ph idx="1"/>
           </p:nvPr>
-        </p:nvPicPr>
-        <p:blipFill>
-          <a:blip r:embed="rId2"/>
-          <a:stretch>
-            <a:fillRect/>
-          </a:stretch>
-        </p:blipFill>
-        <p:spPr>
-          <a:xfrm>
-            <a:off x="4355561" y="291233"/>
-            <a:ext cx="3480877" cy="6191321"/>
-          </a:xfrm>
-        </p:spPr>
-      </p:pic>
+        </p:nvSpPr>
+        <p:spPr/>
+        <p:txBody>
+          <a:bodyPr>
+            <a:normAutofit/>
+          </a:bodyPr>
+          <a:lstStyle/>
+          <a:p>
+            <a:r>
+              <a:rPr lang="fr-FR" dirty="0"/>
+              <a:t>Problème avec le fichier .</a:t>
+            </a:r>
+            <a:r>
+              <a:rPr lang="fr-FR" dirty="0" err="1"/>
+              <a:t>htaccess</a:t>
+            </a:r>
+            <a:endParaRPr lang="fr-FR" dirty="0"/>
+          </a:p>
+          <a:p>
+            <a:r>
+              <a:rPr lang="fr-FR" dirty="0"/>
+              <a:t>J’ai mis les chemins comme on nous avait appris en cours d’apache</a:t>
+            </a:r>
+          </a:p>
+          <a:p>
+            <a:r>
+              <a:rPr lang="fr-FR" dirty="0"/>
+              <a:t>En regardant la documentation sur Infomaniak j’ai vu qu’il fallait mettre le chemin absolu vers le fichier où sont stockés les logins </a:t>
+            </a:r>
+          </a:p>
+          <a:p>
+            <a:r>
+              <a:rPr lang="fr-FR" dirty="0"/>
+              <a:t>J’ai dû connaître le chemin absolu de mon dossier avec une fonction </a:t>
+            </a:r>
+            <a:r>
+              <a:rPr lang="fr-FR" dirty="0" err="1"/>
+              <a:t>php</a:t>
+            </a:r>
+            <a:r>
+              <a:rPr lang="fr-FR" dirty="0"/>
+              <a:t> : </a:t>
+            </a:r>
+            <a:r>
+              <a:rPr lang="fr-CH" dirty="0" err="1"/>
+              <a:t>echo</a:t>
+            </a:r>
+            <a:r>
+              <a:rPr lang="fr-CH" dirty="0"/>
+              <a:t> </a:t>
+            </a:r>
+            <a:r>
+              <a:rPr lang="fr-CH" dirty="0" err="1"/>
+              <a:t>realpath</a:t>
+            </a:r>
+            <a:r>
+              <a:rPr lang="fr-CH" dirty="0"/>
+              <a:t>('</a:t>
+            </a:r>
+            <a:r>
+              <a:rPr lang="fr-CH" dirty="0" err="1"/>
+              <a:t>path.php</a:t>
+            </a:r>
+            <a:r>
+              <a:rPr lang="fr-CH" dirty="0"/>
+              <a:t>’);</a:t>
+            </a:r>
+          </a:p>
+          <a:p>
+            <a:r>
+              <a:rPr lang="fr-FR" dirty="0"/>
+              <a:t>Ensuite j’ai dû créer le mot de passe crypté : </a:t>
+            </a:r>
+            <a:r>
+              <a:rPr lang="fr-CH" dirty="0" err="1"/>
+              <a:t>echo</a:t>
+            </a:r>
+            <a:r>
+              <a:rPr lang="fr-CH" dirty="0"/>
+              <a:t> </a:t>
+            </a:r>
+            <a:r>
+              <a:rPr lang="fr-CH" dirty="0" err="1"/>
+              <a:t>crypt</a:t>
+            </a:r>
+            <a:r>
+              <a:rPr lang="fr-CH" dirty="0"/>
+              <a:t>('</a:t>
+            </a:r>
+            <a:r>
+              <a:rPr lang="fr-CH" dirty="0" err="1"/>
+              <a:t>mdp</a:t>
+            </a:r>
+            <a:r>
+              <a:rPr lang="fr-CH" dirty="0"/>
+              <a:t>’);</a:t>
+            </a:r>
+          </a:p>
+          <a:p>
+            <a:r>
+              <a:rPr lang="fr-FR" dirty="0"/>
+              <a:t>Créer le fichier .</a:t>
+            </a:r>
+            <a:r>
+              <a:rPr lang="fr-FR" dirty="0" err="1"/>
+              <a:t>htaccess</a:t>
+            </a:r>
+            <a:r>
+              <a:rPr lang="fr-FR" dirty="0"/>
+              <a:t> avec le chemin absolu sur mon fichier des </a:t>
+            </a:r>
+            <a:r>
+              <a:rPr lang="fr-FR" dirty="0" err="1"/>
+              <a:t>mdp</a:t>
+            </a:r>
+            <a:r>
+              <a:rPr lang="fr-FR" dirty="0"/>
+              <a:t> + login </a:t>
+            </a:r>
+          </a:p>
+          <a:p>
+            <a:endParaRPr lang="fr-FR" dirty="0"/>
+          </a:p>
+        </p:txBody>
+      </p:sp>
       <p:sp>
         <p:nvSpPr>
           <p:cNvPr id="4" name="ZoneTexte 3">
             <a:extLst>
               <a:ext uri="{FF2B5EF4-FFF2-40B4-BE49-F238E27FC236}">
-                <a16:creationId xmlns:a16="http://schemas.microsoft.com/office/drawing/2014/main" id="{63C15B25-0680-6643-8404-70E2E53F6F2B}"/>
+                <a16:creationId xmlns:a16="http://schemas.microsoft.com/office/drawing/2014/main" id="{DAB237E0-DC7A-2142-B087-C9FA96C24443}"/>
               </a:ext>
             </a:extLst>
           </p:cNvPr>
@@ -4435,8 +4549,8 @@
         </p:nvSpPr>
         <p:spPr>
           <a:xfrm>
-            <a:off x="11406908" y="6297888"/>
-            <a:ext cx="457176" cy="369332"/>
+            <a:off x="11480799" y="6289963"/>
+            <a:ext cx="320922" cy="369332"/>
           </a:xfrm>
           <a:prstGeom prst="rect">
             <a:avLst/>
@@ -4451,7 +4565,7 @@
           <a:p>
             <a:r>
               <a:rPr lang="fr-FR" dirty="0"/>
-              <a:t>10</a:t>
+              <a:t>5</a:t>
             </a:r>
           </a:p>
         </p:txBody>
@@ -4459,7 +4573,7 @@
     </p:spTree>
     <p:extLst>
       <p:ext uri="{BB962C8B-B14F-4D97-AF65-F5344CB8AC3E}">
-        <p14:creationId xmlns:p14="http://schemas.microsoft.com/office/powerpoint/2010/main" val="2552274360"/>
+        <p14:creationId xmlns:p14="http://schemas.microsoft.com/office/powerpoint/2010/main" val="3329647417"/>
       </p:ext>
     </p:extLst>
   </p:cSld>
@@ -4491,7 +4605,7 @@
           <p:cNvPr id="2" name="Titre 1">
             <a:extLst>
               <a:ext uri="{FF2B5EF4-FFF2-40B4-BE49-F238E27FC236}">
-                <a16:creationId xmlns:a16="http://schemas.microsoft.com/office/drawing/2014/main" id="{113484F7-246E-4B4F-8622-DDF8EEDBD389}"/>
+                <a16:creationId xmlns:a16="http://schemas.microsoft.com/office/drawing/2014/main" id="{DFB0DF4F-35E7-324B-B65F-FC5443FE5A58}"/>
               </a:ext>
             </a:extLst>
           </p:cNvPr>
@@ -4509,7 +4623,7 @@
           <a:p>
             <a:r>
               <a:rPr lang="fr-FR" dirty="0"/>
-              <a:t>Difficultés rencontrées</a:t>
+              <a:t>Entretien avec le client </a:t>
             </a:r>
           </a:p>
         </p:txBody>
@@ -4519,7 +4633,7 @@
           <p:cNvPr id="3" name="Espace réservé du contenu 2">
             <a:extLst>
               <a:ext uri="{FF2B5EF4-FFF2-40B4-BE49-F238E27FC236}">
-                <a16:creationId xmlns:a16="http://schemas.microsoft.com/office/drawing/2014/main" id="{24DAE48B-6DF2-5548-9109-AE2164F4DA9B}"/>
+                <a16:creationId xmlns:a16="http://schemas.microsoft.com/office/drawing/2014/main" id="{15477CC0-CA05-F344-93E7-4BEDFEF7C8BE}"/>
               </a:ext>
             </a:extLst>
           </p:cNvPr>
@@ -4532,28 +4646,88 @@
         </p:nvSpPr>
         <p:spPr/>
         <p:txBody>
-          <a:bodyPr/>
-          <a:lstStyle/>
-          <a:p>
-            <a:r>
-              <a:rPr lang="fr-FR" dirty="0"/>
-              <a:t>Gros changement dans la base de données le vendredi avant de rendre le TPI</a:t>
-            </a:r>
-          </a:p>
-          <a:p>
-            <a:r>
-              <a:rPr lang="fr-FR" dirty="0"/>
-              <a:t>Refaire la moitié des fonctions sur le site ainsi que sur l’application mobile </a:t>
-            </a:r>
-          </a:p>
-          <a:p>
-            <a:r>
-              <a:rPr lang="fr-FR" dirty="0"/>
-              <a:t>Quantité calculée différemment pour chaque millésime </a:t>
-            </a:r>
-          </a:p>
-          <a:p>
+          <a:bodyPr>
+            <a:normAutofit/>
+          </a:bodyPr>
+          <a:lstStyle/>
+          <a:p>
+            <a:r>
+              <a:rPr lang="fr-FR" dirty="0"/>
+              <a:t>Ajout du compte du M. Louis Pache dans le fichier .</a:t>
+            </a:r>
+            <a:r>
+              <a:rPr lang="fr-FR" dirty="0" err="1"/>
+              <a:t>htpassword</a:t>
+            </a:r>
             <a:endParaRPr lang="fr-FR" dirty="0"/>
+          </a:p>
+          <a:p>
+            <a:pPr lvl="1"/>
+            <a:r>
+              <a:rPr lang="fr-FR" dirty="0"/>
+              <a:t>Il pourra se connecter dessus avec sur le site </a:t>
+            </a:r>
+          </a:p>
+          <a:p>
+            <a:r>
+              <a:rPr lang="fr-FR" dirty="0"/>
+              <a:t>Installation de </a:t>
+            </a:r>
+            <a:r>
+              <a:rPr lang="fr-FR" dirty="0" err="1"/>
+              <a:t>Ionic</a:t>
+            </a:r>
+            <a:r>
+              <a:rPr lang="fr-FR" dirty="0"/>
+              <a:t> </a:t>
+            </a:r>
+            <a:r>
+              <a:rPr lang="fr-FR" dirty="0" err="1"/>
+              <a:t>View</a:t>
+            </a:r>
+            <a:r>
+              <a:rPr lang="fr-FR" dirty="0"/>
+              <a:t> pour l’application mobile </a:t>
+            </a:r>
+          </a:p>
+          <a:p>
+            <a:pPr lvl="1"/>
+            <a:r>
+              <a:rPr lang="fr-FR" dirty="0"/>
+              <a:t>Entrer le code de l’application pour qu’il l’ait dans la liste </a:t>
+            </a:r>
+          </a:p>
+          <a:p>
+            <a:r>
+              <a:rPr lang="fr-FR" dirty="0"/>
+              <a:t>Explication du fonctionnement de l’application</a:t>
+            </a:r>
+          </a:p>
+          <a:p>
+            <a:r>
+              <a:rPr lang="fr-FR" dirty="0"/>
+              <a:t>Explication du fonctionnement du site </a:t>
+            </a:r>
+          </a:p>
+          <a:p>
+            <a:r>
+              <a:rPr lang="fr-FR" dirty="0"/>
+              <a:t>Il fera des tests avec la base de données actuels, quand il aura suffisamment pris la main sur le site et l’application je lui remettrai une BD vierge</a:t>
+            </a:r>
+          </a:p>
+          <a:p>
+            <a:r>
+              <a:rPr lang="fr-FR" dirty="0"/>
+              <a:t>Après les tests qu’il aura fait il me dira les bugs qu’il trouvera et je ferai ensuite les changements </a:t>
+            </a:r>
+            <a:r>
+              <a:rPr lang="fr-FR" dirty="0" err="1"/>
+              <a:t>adécuats</a:t>
+            </a:r>
+            <a:r>
+              <a:rPr lang="fr-FR" dirty="0"/>
+              <a:t> </a:t>
+            </a:r>
           </a:p>
         </p:txBody>
       </p:sp>
@@ -4562,7 +4736,7 @@
           <p:cNvPr id="4" name="ZoneTexte 3">
             <a:extLst>
               <a:ext uri="{FF2B5EF4-FFF2-40B4-BE49-F238E27FC236}">
-                <a16:creationId xmlns:a16="http://schemas.microsoft.com/office/drawing/2014/main" id="{1FF094D3-3976-D34E-8F62-C3C0E6D70E94}"/>
+                <a16:creationId xmlns:a16="http://schemas.microsoft.com/office/drawing/2014/main" id="{D461D988-6C99-7C4E-9800-FF4E410A7027}"/>
               </a:ext>
             </a:extLst>
           </p:cNvPr>
@@ -4571,8 +4745,8 @@
         </p:nvSpPr>
         <p:spPr>
           <a:xfrm>
-            <a:off x="11406908" y="6297888"/>
-            <a:ext cx="457176" cy="369332"/>
+            <a:off x="11480799" y="6289963"/>
+            <a:ext cx="320922" cy="369332"/>
           </a:xfrm>
           <a:prstGeom prst="rect">
             <a:avLst/>
@@ -4587,7 +4761,7 @@
           <a:p>
             <a:r>
               <a:rPr lang="fr-FR" dirty="0"/>
-              <a:t>11</a:t>
+              <a:t>6</a:t>
             </a:r>
           </a:p>
         </p:txBody>
@@ -4595,7 +4769,7 @@
     </p:spTree>
     <p:extLst>
       <p:ext uri="{BB962C8B-B14F-4D97-AF65-F5344CB8AC3E}">
-        <p14:creationId xmlns:p14="http://schemas.microsoft.com/office/powerpoint/2010/main" val="3377292038"/>
+        <p14:creationId xmlns:p14="http://schemas.microsoft.com/office/powerpoint/2010/main" val="2737234727"/>
       </p:ext>
     </p:extLst>
   </p:cSld>
@@ -4627,1287 +4801,6 @@
           <p:cNvPr id="2" name="Titre 1">
             <a:extLst>
               <a:ext uri="{FF2B5EF4-FFF2-40B4-BE49-F238E27FC236}">
-                <a16:creationId xmlns:a16="http://schemas.microsoft.com/office/drawing/2014/main" id="{F0EEA0CA-3B16-D14F-8FC8-2069CE075D37}"/>
-              </a:ext>
-            </a:extLst>
-          </p:cNvPr>
-          <p:cNvSpPr>
-            <a:spLocks noGrp="1"/>
-          </p:cNvSpPr>
-          <p:nvPr>
-            <p:ph type="title"/>
-          </p:nvPr>
-        </p:nvSpPr>
-        <p:spPr/>
-        <p:txBody>
-          <a:bodyPr/>
-          <a:lstStyle/>
-          <a:p>
-            <a:r>
-              <a:rPr lang="fr-FR" dirty="0"/>
-              <a:t>Améliorations</a:t>
-            </a:r>
-          </a:p>
-        </p:txBody>
-      </p:sp>
-      <p:sp>
-        <p:nvSpPr>
-          <p:cNvPr id="3" name="Espace réservé du contenu 2">
-            <a:extLst>
-              <a:ext uri="{FF2B5EF4-FFF2-40B4-BE49-F238E27FC236}">
-                <a16:creationId xmlns:a16="http://schemas.microsoft.com/office/drawing/2014/main" id="{04EE4C1D-CCA0-E04B-A878-8ECCE60137BF}"/>
-              </a:ext>
-            </a:extLst>
-          </p:cNvPr>
-          <p:cNvSpPr>
-            <a:spLocks noGrp="1"/>
-          </p:cNvSpPr>
-          <p:nvPr>
-            <p:ph idx="1"/>
-          </p:nvPr>
-        </p:nvSpPr>
-        <p:spPr/>
-        <p:txBody>
-          <a:bodyPr/>
-          <a:lstStyle/>
-          <a:p>
-            <a:r>
-              <a:rPr lang="fr-FR" dirty="0"/>
-              <a:t>Page permettant de créer des utilisateurs ainsi qu’un mot de passe crypté</a:t>
-            </a:r>
-          </a:p>
-          <a:p>
-            <a:r>
-              <a:rPr lang="fr-FR" dirty="0"/>
-              <a:t>Page de login sur l’application mobile </a:t>
-            </a:r>
-          </a:p>
-          <a:p>
-            <a:endParaRPr lang="fr-FR" dirty="0"/>
-          </a:p>
-          <a:p>
-            <a:endParaRPr lang="fr-FR" dirty="0"/>
-          </a:p>
-          <a:p>
-            <a:endParaRPr lang="fr-FR" dirty="0"/>
-          </a:p>
-        </p:txBody>
-      </p:sp>
-      <p:sp>
-        <p:nvSpPr>
-          <p:cNvPr id="4" name="ZoneTexte 3">
-            <a:extLst>
-              <a:ext uri="{FF2B5EF4-FFF2-40B4-BE49-F238E27FC236}">
-                <a16:creationId xmlns:a16="http://schemas.microsoft.com/office/drawing/2014/main" id="{606F2F88-F5E1-3A45-AE9A-E264E472064C}"/>
-              </a:ext>
-            </a:extLst>
-          </p:cNvPr>
-          <p:cNvSpPr txBox="1"/>
-          <p:nvPr/>
-        </p:nvSpPr>
-        <p:spPr>
-          <a:xfrm>
-            <a:off x="11406908" y="6297888"/>
-            <a:ext cx="457176" cy="369332"/>
-          </a:xfrm>
-          <a:prstGeom prst="rect">
-            <a:avLst/>
-          </a:prstGeom>
-          <a:noFill/>
-        </p:spPr>
-        <p:txBody>
-          <a:bodyPr wrap="none" rtlCol="0">
-            <a:spAutoFit/>
-          </a:bodyPr>
-          <a:lstStyle/>
-          <a:p>
-            <a:r>
-              <a:rPr lang="fr-FR" dirty="0"/>
-              <a:t>12</a:t>
-            </a:r>
-          </a:p>
-        </p:txBody>
-      </p:sp>
-    </p:spTree>
-    <p:extLst>
-      <p:ext uri="{BB962C8B-B14F-4D97-AF65-F5344CB8AC3E}">
-        <p14:creationId xmlns:p14="http://schemas.microsoft.com/office/powerpoint/2010/main" val="3966416713"/>
-      </p:ext>
-    </p:extLst>
-  </p:cSld>
-  <p:clrMapOvr>
-    <a:masterClrMapping/>
-  </p:clrMapOvr>
-</p:sld>
-</file>
-
-<file path=ppt/slides/slide13.xml><?xml version="1.0" encoding="utf-8"?>
-<p:sld xmlns:a="http://schemas.openxmlformats.org/drawingml/2006/main" xmlns:r="http://schemas.openxmlformats.org/officeDocument/2006/relationships" xmlns:p="http://schemas.openxmlformats.org/presentationml/2006/main">
-  <p:cSld>
-    <p:spTree>
-      <p:nvGrpSpPr>
-        <p:cNvPr id="1" name=""/>
-        <p:cNvGrpSpPr/>
-        <p:nvPr/>
-      </p:nvGrpSpPr>
-      <p:grpSpPr>
-        <a:xfrm>
-          <a:off x="0" y="0"/>
-          <a:ext cx="0" cy="0"/>
-          <a:chOff x="0" y="0"/>
-          <a:chExt cx="0" cy="0"/>
-        </a:xfrm>
-      </p:grpSpPr>
-      <p:sp>
-        <p:nvSpPr>
-          <p:cNvPr id="2" name="Titre 1">
-            <a:extLst>
-              <a:ext uri="{FF2B5EF4-FFF2-40B4-BE49-F238E27FC236}">
-                <a16:creationId xmlns:a16="http://schemas.microsoft.com/office/drawing/2014/main" id="{EFAF7BC5-DCD3-A14B-B2DC-605CFAE91FD0}"/>
-              </a:ext>
-            </a:extLst>
-          </p:cNvPr>
-          <p:cNvSpPr>
-            <a:spLocks noGrp="1"/>
-          </p:cNvSpPr>
-          <p:nvPr>
-            <p:ph type="title"/>
-          </p:nvPr>
-        </p:nvSpPr>
-        <p:spPr/>
-        <p:txBody>
-          <a:bodyPr/>
-          <a:lstStyle/>
-          <a:p>
-            <a:r>
-              <a:rPr lang="fr-FR" dirty="0"/>
-              <a:t>Points positifs</a:t>
-            </a:r>
-          </a:p>
-        </p:txBody>
-      </p:sp>
-      <p:sp>
-        <p:nvSpPr>
-          <p:cNvPr id="3" name="Espace réservé du contenu 2">
-            <a:extLst>
-              <a:ext uri="{FF2B5EF4-FFF2-40B4-BE49-F238E27FC236}">
-                <a16:creationId xmlns:a16="http://schemas.microsoft.com/office/drawing/2014/main" id="{6950E3C6-DEC8-D84A-B8D3-01DD72CA2F8A}"/>
-              </a:ext>
-            </a:extLst>
-          </p:cNvPr>
-          <p:cNvSpPr>
-            <a:spLocks noGrp="1"/>
-          </p:cNvSpPr>
-          <p:nvPr>
-            <p:ph idx="1"/>
-          </p:nvPr>
-        </p:nvSpPr>
-        <p:spPr/>
-        <p:txBody>
-          <a:bodyPr/>
-          <a:lstStyle/>
-          <a:p>
-            <a:r>
-              <a:rPr lang="fr-FR" dirty="0"/>
-              <a:t>Apprentissage approfondit avec </a:t>
-            </a:r>
-            <a:r>
-              <a:rPr lang="fr-FR" dirty="0" err="1"/>
-              <a:t>ionic</a:t>
-            </a:r>
-            <a:r>
-              <a:rPr lang="fr-FR" dirty="0"/>
-              <a:t> </a:t>
-            </a:r>
-          </a:p>
-          <a:p>
-            <a:r>
-              <a:rPr lang="fr-FR" dirty="0"/>
-              <a:t>Apprentissage de nouvelles fonctions en PHP</a:t>
-            </a:r>
-          </a:p>
-          <a:p>
-            <a:r>
-              <a:rPr lang="fr-FR" dirty="0"/>
-              <a:t>Le stresse pour finir tout à temps</a:t>
-            </a:r>
-          </a:p>
-          <a:p>
-            <a:r>
-              <a:rPr lang="fr-FR" dirty="0"/>
-              <a:t>Le client </a:t>
-            </a:r>
-          </a:p>
-          <a:p>
-            <a:r>
-              <a:rPr lang="fr-FR" dirty="0"/>
-              <a:t>Faire un projet concret qui sera utilisé </a:t>
-            </a:r>
-          </a:p>
-          <a:p>
-            <a:endParaRPr lang="fr-FR" dirty="0"/>
-          </a:p>
-          <a:p>
-            <a:endParaRPr lang="fr-FR" dirty="0"/>
-          </a:p>
-          <a:p>
-            <a:endParaRPr lang="fr-FR" dirty="0"/>
-          </a:p>
-          <a:p>
-            <a:endParaRPr lang="fr-FR" dirty="0"/>
-          </a:p>
-        </p:txBody>
-      </p:sp>
-      <p:sp>
-        <p:nvSpPr>
-          <p:cNvPr id="4" name="ZoneTexte 3">
-            <a:extLst>
-              <a:ext uri="{FF2B5EF4-FFF2-40B4-BE49-F238E27FC236}">
-                <a16:creationId xmlns:a16="http://schemas.microsoft.com/office/drawing/2014/main" id="{BE8C7BE7-4894-4940-9575-A47B9ECC3D90}"/>
-              </a:ext>
-            </a:extLst>
-          </p:cNvPr>
-          <p:cNvSpPr txBox="1"/>
-          <p:nvPr/>
-        </p:nvSpPr>
-        <p:spPr>
-          <a:xfrm>
-            <a:off x="11406908" y="6297888"/>
-            <a:ext cx="457176" cy="369332"/>
-          </a:xfrm>
-          <a:prstGeom prst="rect">
-            <a:avLst/>
-          </a:prstGeom>
-          <a:noFill/>
-        </p:spPr>
-        <p:txBody>
-          <a:bodyPr wrap="none" rtlCol="0">
-            <a:spAutoFit/>
-          </a:bodyPr>
-          <a:lstStyle/>
-          <a:p>
-            <a:r>
-              <a:rPr lang="fr-FR" dirty="0"/>
-              <a:t>13</a:t>
-            </a:r>
-          </a:p>
-        </p:txBody>
-      </p:sp>
-    </p:spTree>
-    <p:extLst>
-      <p:ext uri="{BB962C8B-B14F-4D97-AF65-F5344CB8AC3E}">
-        <p14:creationId xmlns:p14="http://schemas.microsoft.com/office/powerpoint/2010/main" val="4202757423"/>
-      </p:ext>
-    </p:extLst>
-  </p:cSld>
-  <p:clrMapOvr>
-    <a:masterClrMapping/>
-  </p:clrMapOvr>
-</p:sld>
-</file>
-
-<file path=ppt/slides/slide14.xml><?xml version="1.0" encoding="utf-8"?>
-<p:sld xmlns:a="http://schemas.openxmlformats.org/drawingml/2006/main" xmlns:r="http://schemas.openxmlformats.org/officeDocument/2006/relationships" xmlns:p="http://schemas.openxmlformats.org/presentationml/2006/main">
-  <p:cSld>
-    <p:spTree>
-      <p:nvGrpSpPr>
-        <p:cNvPr id="1" name=""/>
-        <p:cNvGrpSpPr/>
-        <p:nvPr/>
-      </p:nvGrpSpPr>
-      <p:grpSpPr>
-        <a:xfrm>
-          <a:off x="0" y="0"/>
-          <a:ext cx="0" cy="0"/>
-          <a:chOff x="0" y="0"/>
-          <a:chExt cx="0" cy="0"/>
-        </a:xfrm>
-      </p:grpSpPr>
-      <p:sp>
-        <p:nvSpPr>
-          <p:cNvPr id="2" name="Titre 1">
-            <a:extLst>
-              <a:ext uri="{FF2B5EF4-FFF2-40B4-BE49-F238E27FC236}">
-                <a16:creationId xmlns:a16="http://schemas.microsoft.com/office/drawing/2014/main" id="{75E1B9BB-D0F5-8740-88DE-6961715A23F3}"/>
-              </a:ext>
-            </a:extLst>
-          </p:cNvPr>
-          <p:cNvSpPr>
-            <a:spLocks noGrp="1"/>
-          </p:cNvSpPr>
-          <p:nvPr>
-            <p:ph type="title"/>
-          </p:nvPr>
-        </p:nvSpPr>
-        <p:spPr/>
-        <p:txBody>
-          <a:bodyPr/>
-          <a:lstStyle/>
-          <a:p>
-            <a:r>
-              <a:rPr lang="fr-FR" dirty="0"/>
-              <a:t>Questions ?</a:t>
-            </a:r>
-          </a:p>
-        </p:txBody>
-      </p:sp>
-      <p:sp>
-        <p:nvSpPr>
-          <p:cNvPr id="3" name="Espace réservé du contenu 2">
-            <a:extLst>
-              <a:ext uri="{FF2B5EF4-FFF2-40B4-BE49-F238E27FC236}">
-                <a16:creationId xmlns:a16="http://schemas.microsoft.com/office/drawing/2014/main" id="{6C57822B-04F7-EA40-8AA1-E9842AE8BBAA}"/>
-              </a:ext>
-            </a:extLst>
-          </p:cNvPr>
-          <p:cNvSpPr>
-            <a:spLocks noGrp="1"/>
-          </p:cNvSpPr>
-          <p:nvPr>
-            <p:ph idx="1"/>
-          </p:nvPr>
-        </p:nvSpPr>
-        <p:spPr/>
-        <p:txBody>
-          <a:bodyPr/>
-          <a:lstStyle/>
-          <a:p>
-            <a:endParaRPr lang="fr-FR"/>
-          </a:p>
-        </p:txBody>
-      </p:sp>
-      <p:sp>
-        <p:nvSpPr>
-          <p:cNvPr id="4" name="ZoneTexte 3">
-            <a:extLst>
-              <a:ext uri="{FF2B5EF4-FFF2-40B4-BE49-F238E27FC236}">
-                <a16:creationId xmlns:a16="http://schemas.microsoft.com/office/drawing/2014/main" id="{5F8F30CE-4293-2041-B7A3-B6539329FCAB}"/>
-              </a:ext>
-            </a:extLst>
-          </p:cNvPr>
-          <p:cNvSpPr txBox="1"/>
-          <p:nvPr/>
-        </p:nvSpPr>
-        <p:spPr>
-          <a:xfrm>
-            <a:off x="11406908" y="6297888"/>
-            <a:ext cx="457176" cy="369332"/>
-          </a:xfrm>
-          <a:prstGeom prst="rect">
-            <a:avLst/>
-          </a:prstGeom>
-          <a:noFill/>
-        </p:spPr>
-        <p:txBody>
-          <a:bodyPr wrap="none" rtlCol="0">
-            <a:spAutoFit/>
-          </a:bodyPr>
-          <a:lstStyle/>
-          <a:p>
-            <a:r>
-              <a:rPr lang="fr-FR" dirty="0"/>
-              <a:t>14</a:t>
-            </a:r>
-          </a:p>
-        </p:txBody>
-      </p:sp>
-    </p:spTree>
-    <p:extLst>
-      <p:ext uri="{BB962C8B-B14F-4D97-AF65-F5344CB8AC3E}">
-        <p14:creationId xmlns:p14="http://schemas.microsoft.com/office/powerpoint/2010/main" val="152265451"/>
-      </p:ext>
-    </p:extLst>
-  </p:cSld>
-  <p:clrMapOvr>
-    <a:masterClrMapping/>
-  </p:clrMapOvr>
-</p:sld>
-</file>
-
-<file path=ppt/slides/slide2.xml><?xml version="1.0" encoding="utf-8"?>
-<p:sld xmlns:a="http://schemas.openxmlformats.org/drawingml/2006/main" xmlns:r="http://schemas.openxmlformats.org/officeDocument/2006/relationships" xmlns:p="http://schemas.openxmlformats.org/presentationml/2006/main">
-  <p:cSld>
-    <p:spTree>
-      <p:nvGrpSpPr>
-        <p:cNvPr id="1" name=""/>
-        <p:cNvGrpSpPr/>
-        <p:nvPr/>
-      </p:nvGrpSpPr>
-      <p:grpSpPr>
-        <a:xfrm>
-          <a:off x="0" y="0"/>
-          <a:ext cx="0" cy="0"/>
-          <a:chOff x="0" y="0"/>
-          <a:chExt cx="0" cy="0"/>
-        </a:xfrm>
-      </p:grpSpPr>
-      <p:sp>
-        <p:nvSpPr>
-          <p:cNvPr id="2" name="Titre 1">
-            <a:extLst>
-              <a:ext uri="{FF2B5EF4-FFF2-40B4-BE49-F238E27FC236}">
-                <a16:creationId xmlns:a16="http://schemas.microsoft.com/office/drawing/2014/main" id="{152591FC-1002-5842-83F0-7D8B0E5A9D14}"/>
-              </a:ext>
-            </a:extLst>
-          </p:cNvPr>
-          <p:cNvSpPr>
-            <a:spLocks noGrp="1"/>
-          </p:cNvSpPr>
-          <p:nvPr>
-            <p:ph type="title"/>
-          </p:nvPr>
-        </p:nvSpPr>
-        <p:spPr/>
-        <p:txBody>
-          <a:bodyPr/>
-          <a:lstStyle/>
-          <a:p>
-            <a:r>
-              <a:rPr lang="fr-FR" dirty="0"/>
-              <a:t>Introduction</a:t>
-            </a:r>
-          </a:p>
-        </p:txBody>
-      </p:sp>
-      <p:sp>
-        <p:nvSpPr>
-          <p:cNvPr id="3" name="Espace réservé du contenu 2">
-            <a:extLst>
-              <a:ext uri="{FF2B5EF4-FFF2-40B4-BE49-F238E27FC236}">
-                <a16:creationId xmlns:a16="http://schemas.microsoft.com/office/drawing/2014/main" id="{1939E1C6-9CE1-3649-902D-F9F092FC4373}"/>
-              </a:ext>
-            </a:extLst>
-          </p:cNvPr>
-          <p:cNvSpPr>
-            <a:spLocks noGrp="1"/>
-          </p:cNvSpPr>
-          <p:nvPr>
-            <p:ph idx="1"/>
-          </p:nvPr>
-        </p:nvSpPr>
-        <p:spPr/>
-        <p:txBody>
-          <a:bodyPr/>
-          <a:lstStyle/>
-          <a:p>
-            <a:r>
-              <a:rPr lang="fr-FR" dirty="0"/>
-              <a:t>1 client, M. Louis Pache</a:t>
-            </a:r>
-          </a:p>
-          <a:p>
-            <a:r>
-              <a:rPr lang="fr-FR" dirty="0"/>
-              <a:t>Cercle d’Yverdon </a:t>
-            </a:r>
-          </a:p>
-          <a:p>
-            <a:r>
-              <a:rPr lang="fr-FR" dirty="0"/>
-              <a:t>Gestion de cave </a:t>
-            </a:r>
-          </a:p>
-          <a:p>
-            <a:r>
-              <a:rPr lang="fr-FR" dirty="0"/>
-              <a:t>Aide au CPNV</a:t>
-            </a:r>
-          </a:p>
-          <a:p>
-            <a:r>
-              <a:rPr lang="fr-FR" dirty="0"/>
-              <a:t>Application mobile et site web </a:t>
-            </a:r>
-          </a:p>
-          <a:p>
-            <a:r>
-              <a:rPr lang="fr-FR" dirty="0"/>
-              <a:t>Pré-TPI, site + application mobile</a:t>
-            </a:r>
-          </a:p>
-          <a:p>
-            <a:r>
-              <a:rPr lang="fr-FR" dirty="0"/>
-              <a:t>Tâche de faire ce projet</a:t>
-            </a:r>
-          </a:p>
-        </p:txBody>
-      </p:sp>
-      <p:sp>
-        <p:nvSpPr>
-          <p:cNvPr id="4" name="ZoneTexte 3">
-            <a:extLst>
-              <a:ext uri="{FF2B5EF4-FFF2-40B4-BE49-F238E27FC236}">
-                <a16:creationId xmlns:a16="http://schemas.microsoft.com/office/drawing/2014/main" id="{CE59A308-95E8-B34E-BC94-40485EE01DB6}"/>
-              </a:ext>
-            </a:extLst>
-          </p:cNvPr>
-          <p:cNvSpPr txBox="1"/>
-          <p:nvPr/>
-        </p:nvSpPr>
-        <p:spPr>
-          <a:xfrm>
-            <a:off x="11480799" y="6289963"/>
-            <a:ext cx="320922" cy="369332"/>
-          </a:xfrm>
-          <a:prstGeom prst="rect">
-            <a:avLst/>
-          </a:prstGeom>
-          <a:noFill/>
-        </p:spPr>
-        <p:txBody>
-          <a:bodyPr wrap="none" rtlCol="0">
-            <a:spAutoFit/>
-          </a:bodyPr>
-          <a:lstStyle/>
-          <a:p>
-            <a:r>
-              <a:rPr lang="fr-FR" dirty="0"/>
-              <a:t>2</a:t>
-            </a:r>
-          </a:p>
-        </p:txBody>
-      </p:sp>
-    </p:spTree>
-    <p:extLst>
-      <p:ext uri="{BB962C8B-B14F-4D97-AF65-F5344CB8AC3E}">
-        <p14:creationId xmlns:p14="http://schemas.microsoft.com/office/powerpoint/2010/main" val="1662323745"/>
-      </p:ext>
-    </p:extLst>
-  </p:cSld>
-  <p:clrMapOvr>
-    <a:masterClrMapping/>
-  </p:clrMapOvr>
-</p:sld>
-</file>
-
-<file path=ppt/slides/slide3.xml><?xml version="1.0" encoding="utf-8"?>
-<p:sld xmlns:a="http://schemas.openxmlformats.org/drawingml/2006/main" xmlns:r="http://schemas.openxmlformats.org/officeDocument/2006/relationships" xmlns:p="http://schemas.openxmlformats.org/presentationml/2006/main">
-  <p:cSld>
-    <p:spTree>
-      <p:nvGrpSpPr>
-        <p:cNvPr id="1" name=""/>
-        <p:cNvGrpSpPr/>
-        <p:nvPr/>
-      </p:nvGrpSpPr>
-      <p:grpSpPr>
-        <a:xfrm>
-          <a:off x="0" y="0"/>
-          <a:ext cx="0" cy="0"/>
-          <a:chOff x="0" y="0"/>
-          <a:chExt cx="0" cy="0"/>
-        </a:xfrm>
-      </p:grpSpPr>
-      <p:sp>
-        <p:nvSpPr>
-          <p:cNvPr id="2" name="Titre 1">
-            <a:extLst>
-              <a:ext uri="{FF2B5EF4-FFF2-40B4-BE49-F238E27FC236}">
-                <a16:creationId xmlns:a16="http://schemas.microsoft.com/office/drawing/2014/main" id="{ACD7763A-0C4E-AB40-BF95-242E25A615D2}"/>
-              </a:ext>
-            </a:extLst>
-          </p:cNvPr>
-          <p:cNvSpPr>
-            <a:spLocks noGrp="1"/>
-          </p:cNvSpPr>
-          <p:nvPr>
-            <p:ph type="title"/>
-          </p:nvPr>
-        </p:nvSpPr>
-        <p:spPr/>
-        <p:txBody>
-          <a:bodyPr/>
-          <a:lstStyle/>
-          <a:p>
-            <a:r>
-              <a:rPr lang="fr-FR" dirty="0"/>
-              <a:t>Gestion de la cave</a:t>
-            </a:r>
-          </a:p>
-        </p:txBody>
-      </p:sp>
-      <p:pic>
-        <p:nvPicPr>
-          <p:cNvPr id="5" name="Espace réservé du contenu 4">
-            <a:extLst>
-              <a:ext uri="{FF2B5EF4-FFF2-40B4-BE49-F238E27FC236}">
-                <a16:creationId xmlns:a16="http://schemas.microsoft.com/office/drawing/2014/main" id="{B229CE2C-2A87-1441-9757-97E10BD393B4}"/>
-              </a:ext>
-            </a:extLst>
-          </p:cNvPr>
-          <p:cNvPicPr>
-            <a:picLocks noGrp="1" noChangeAspect="1"/>
-          </p:cNvPicPr>
-          <p:nvPr>
-            <p:ph idx="1"/>
-          </p:nvPr>
-        </p:nvPicPr>
-        <p:blipFill rotWithShape="1">
-          <a:blip r:embed="rId2"/>
-          <a:srcRect l="5176" t="7554" r="9915" b="5755"/>
-          <a:stretch/>
-        </p:blipFill>
-        <p:spPr>
-          <a:xfrm rot="5400000">
-            <a:off x="5827392" y="804317"/>
-            <a:ext cx="6866434" cy="5257800"/>
-          </a:xfrm>
-        </p:spPr>
-      </p:pic>
-      <p:sp>
-        <p:nvSpPr>
-          <p:cNvPr id="6" name="ZoneTexte 5">
-            <a:extLst>
-              <a:ext uri="{FF2B5EF4-FFF2-40B4-BE49-F238E27FC236}">
-                <a16:creationId xmlns:a16="http://schemas.microsoft.com/office/drawing/2014/main" id="{FEF48E5C-53E8-7348-8E84-854C2A70E082}"/>
-              </a:ext>
-            </a:extLst>
-          </p:cNvPr>
-          <p:cNvSpPr txBox="1"/>
-          <p:nvPr/>
-        </p:nvSpPr>
-        <p:spPr>
-          <a:xfrm>
-            <a:off x="1069848" y="2909997"/>
-            <a:ext cx="4102516" cy="523220"/>
-          </a:xfrm>
-          <a:prstGeom prst="rect">
-            <a:avLst/>
-          </a:prstGeom>
-          <a:noFill/>
-        </p:spPr>
-        <p:txBody>
-          <a:bodyPr wrap="square" rtlCol="0">
-            <a:spAutoFit/>
-          </a:bodyPr>
-          <a:lstStyle/>
-          <a:p>
-            <a:pPr marL="457200" indent="-457200">
-              <a:buFont typeface="Arial" panose="020B0604020202020204" pitchFamily="34" charset="0"/>
-              <a:buChar char="•"/>
-            </a:pPr>
-            <a:r>
-              <a:rPr lang="fr-FR" sz="2800" dirty="0"/>
-              <a:t>Ancienne méthode</a:t>
-            </a:r>
-          </a:p>
-        </p:txBody>
-      </p:sp>
-    </p:spTree>
-    <p:extLst>
-      <p:ext uri="{BB962C8B-B14F-4D97-AF65-F5344CB8AC3E}">
-        <p14:creationId xmlns:p14="http://schemas.microsoft.com/office/powerpoint/2010/main" val="3437800917"/>
-      </p:ext>
-    </p:extLst>
-  </p:cSld>
-  <p:clrMapOvr>
-    <a:masterClrMapping/>
-  </p:clrMapOvr>
-</p:sld>
-</file>
-
-<file path=ppt/slides/slide4.xml><?xml version="1.0" encoding="utf-8"?>
-<p:sld xmlns:a="http://schemas.openxmlformats.org/drawingml/2006/main" xmlns:r="http://schemas.openxmlformats.org/officeDocument/2006/relationships" xmlns:p="http://schemas.openxmlformats.org/presentationml/2006/main">
-  <p:cSld>
-    <p:spTree>
-      <p:nvGrpSpPr>
-        <p:cNvPr id="1" name=""/>
-        <p:cNvGrpSpPr/>
-        <p:nvPr/>
-      </p:nvGrpSpPr>
-      <p:grpSpPr>
-        <a:xfrm>
-          <a:off x="0" y="0"/>
-          <a:ext cx="0" cy="0"/>
-          <a:chOff x="0" y="0"/>
-          <a:chExt cx="0" cy="0"/>
-        </a:xfrm>
-      </p:grpSpPr>
-      <p:sp>
-        <p:nvSpPr>
-          <p:cNvPr id="2" name="Titre 1">
-            <a:extLst>
-              <a:ext uri="{FF2B5EF4-FFF2-40B4-BE49-F238E27FC236}">
-                <a16:creationId xmlns:a16="http://schemas.microsoft.com/office/drawing/2014/main" id="{8291E58B-1C17-7F4A-812A-153FC31E9A54}"/>
-              </a:ext>
-            </a:extLst>
-          </p:cNvPr>
-          <p:cNvSpPr>
-            <a:spLocks noGrp="1"/>
-          </p:cNvSpPr>
-          <p:nvPr>
-            <p:ph type="title"/>
-          </p:nvPr>
-        </p:nvSpPr>
-        <p:spPr/>
-        <p:txBody>
-          <a:bodyPr/>
-          <a:lstStyle/>
-          <a:p>
-            <a:r>
-              <a:rPr lang="fr-FR" dirty="0"/>
-              <a:t>Mise en production </a:t>
-            </a:r>
-          </a:p>
-        </p:txBody>
-      </p:sp>
-      <p:sp>
-        <p:nvSpPr>
-          <p:cNvPr id="3" name="Espace réservé du contenu 2">
-            <a:extLst>
-              <a:ext uri="{FF2B5EF4-FFF2-40B4-BE49-F238E27FC236}">
-                <a16:creationId xmlns:a16="http://schemas.microsoft.com/office/drawing/2014/main" id="{62C846C1-C67B-364F-B695-0D4C539580A7}"/>
-              </a:ext>
-            </a:extLst>
-          </p:cNvPr>
-          <p:cNvSpPr>
-            <a:spLocks noGrp="1"/>
-          </p:cNvSpPr>
-          <p:nvPr>
-            <p:ph idx="1"/>
-          </p:nvPr>
-        </p:nvSpPr>
-        <p:spPr/>
-        <p:txBody>
-          <a:bodyPr/>
-          <a:lstStyle/>
-          <a:p>
-            <a:r>
-              <a:rPr lang="fr-FR" dirty="0"/>
-              <a:t>Ce qui était convenu avec le client c’est qu’on ne devait pas gérer les logins sur le site, vu qu’ils ont déjà un système de login sur le site. </a:t>
-            </a:r>
-          </a:p>
-          <a:p>
-            <a:r>
-              <a:rPr lang="fr-FR" dirty="0"/>
-              <a:t>Vu que le webmaster n’était pas au courant de ça j’ai créé une protection avec un fichier .</a:t>
-            </a:r>
-            <a:r>
-              <a:rPr lang="fr-FR" dirty="0" err="1"/>
-              <a:t>htaccess</a:t>
-            </a:r>
-            <a:r>
-              <a:rPr lang="fr-FR" dirty="0"/>
-              <a:t> qui demande un login + </a:t>
-            </a:r>
-            <a:r>
-              <a:rPr lang="fr-FR" dirty="0" err="1"/>
-              <a:t>mdp</a:t>
-            </a:r>
-            <a:r>
-              <a:rPr lang="fr-FR" dirty="0"/>
-              <a:t> qui sont stockés dans le fichier .</a:t>
-            </a:r>
-            <a:r>
-              <a:rPr lang="fr-FR" dirty="0" err="1"/>
-              <a:t>htpassword</a:t>
-            </a:r>
-            <a:r>
-              <a:rPr lang="fr-FR" dirty="0"/>
-              <a:t> lorsqu’on arrive sur ma partie du site.</a:t>
-            </a:r>
-          </a:p>
-        </p:txBody>
-      </p:sp>
-      <p:sp>
-        <p:nvSpPr>
-          <p:cNvPr id="4" name="ZoneTexte 3">
-            <a:extLst>
-              <a:ext uri="{FF2B5EF4-FFF2-40B4-BE49-F238E27FC236}">
-                <a16:creationId xmlns:a16="http://schemas.microsoft.com/office/drawing/2014/main" id="{3D95E02C-40C9-E14E-981E-D63D89649598}"/>
-              </a:ext>
-            </a:extLst>
-          </p:cNvPr>
-          <p:cNvSpPr txBox="1"/>
-          <p:nvPr/>
-        </p:nvSpPr>
-        <p:spPr>
-          <a:xfrm>
-            <a:off x="11480799" y="6289963"/>
-            <a:ext cx="320922" cy="369332"/>
-          </a:xfrm>
-          <a:prstGeom prst="rect">
-            <a:avLst/>
-          </a:prstGeom>
-          <a:noFill/>
-        </p:spPr>
-        <p:txBody>
-          <a:bodyPr wrap="none" rtlCol="0">
-            <a:spAutoFit/>
-          </a:bodyPr>
-          <a:lstStyle/>
-          <a:p>
-            <a:r>
-              <a:rPr lang="fr-FR" dirty="0"/>
-              <a:t>4</a:t>
-            </a:r>
-          </a:p>
-        </p:txBody>
-      </p:sp>
-    </p:spTree>
-    <p:extLst>
-      <p:ext uri="{BB962C8B-B14F-4D97-AF65-F5344CB8AC3E}">
-        <p14:creationId xmlns:p14="http://schemas.microsoft.com/office/powerpoint/2010/main" val="1776768230"/>
-      </p:ext>
-    </p:extLst>
-  </p:cSld>
-  <p:clrMapOvr>
-    <a:masterClrMapping/>
-  </p:clrMapOvr>
-</p:sld>
-</file>
-
-<file path=ppt/slides/slide5.xml><?xml version="1.0" encoding="utf-8"?>
-<p:sld xmlns:a="http://schemas.openxmlformats.org/drawingml/2006/main" xmlns:r="http://schemas.openxmlformats.org/officeDocument/2006/relationships" xmlns:p="http://schemas.openxmlformats.org/presentationml/2006/main">
-  <p:cSld>
-    <p:spTree>
-      <p:nvGrpSpPr>
-        <p:cNvPr id="1" name=""/>
-        <p:cNvGrpSpPr/>
-        <p:nvPr/>
-      </p:nvGrpSpPr>
-      <p:grpSpPr>
-        <a:xfrm>
-          <a:off x="0" y="0"/>
-          <a:ext cx="0" cy="0"/>
-          <a:chOff x="0" y="0"/>
-          <a:chExt cx="0" cy="0"/>
-        </a:xfrm>
-      </p:grpSpPr>
-      <p:sp>
-        <p:nvSpPr>
-          <p:cNvPr id="2" name="Titre 1">
-            <a:extLst>
-              <a:ext uri="{FF2B5EF4-FFF2-40B4-BE49-F238E27FC236}">
-                <a16:creationId xmlns:a16="http://schemas.microsoft.com/office/drawing/2014/main" id="{20C5F73D-F677-7341-8DE8-52EF740466AA}"/>
-              </a:ext>
-            </a:extLst>
-          </p:cNvPr>
-          <p:cNvSpPr>
-            <a:spLocks noGrp="1"/>
-          </p:cNvSpPr>
-          <p:nvPr>
-            <p:ph type="title"/>
-          </p:nvPr>
-        </p:nvSpPr>
-        <p:spPr/>
-        <p:txBody>
-          <a:bodyPr/>
-          <a:lstStyle/>
-          <a:p>
-            <a:r>
-              <a:rPr lang="fr-FR" dirty="0"/>
-              <a:t>Mise en production </a:t>
-            </a:r>
-          </a:p>
-        </p:txBody>
-      </p:sp>
-      <p:sp>
-        <p:nvSpPr>
-          <p:cNvPr id="3" name="Espace réservé du contenu 2">
-            <a:extLst>
-              <a:ext uri="{FF2B5EF4-FFF2-40B4-BE49-F238E27FC236}">
-                <a16:creationId xmlns:a16="http://schemas.microsoft.com/office/drawing/2014/main" id="{E76336E2-2F50-3E45-B944-ABFC072AD902}"/>
-              </a:ext>
-            </a:extLst>
-          </p:cNvPr>
-          <p:cNvSpPr>
-            <a:spLocks noGrp="1"/>
-          </p:cNvSpPr>
-          <p:nvPr>
-            <p:ph idx="1"/>
-          </p:nvPr>
-        </p:nvSpPr>
-        <p:spPr/>
-        <p:txBody>
-          <a:bodyPr>
-            <a:normAutofit/>
-          </a:bodyPr>
-          <a:lstStyle/>
-          <a:p>
-            <a:r>
-              <a:rPr lang="fr-FR" dirty="0"/>
-              <a:t>Problème avec le fichier .</a:t>
-            </a:r>
-            <a:r>
-              <a:rPr lang="fr-FR" dirty="0" err="1"/>
-              <a:t>htaccess</a:t>
-            </a:r>
-            <a:endParaRPr lang="fr-FR" dirty="0"/>
-          </a:p>
-          <a:p>
-            <a:r>
-              <a:rPr lang="fr-FR" dirty="0"/>
-              <a:t>J’ai mis les chemins comme on nous avait appris en cours d’apache</a:t>
-            </a:r>
-          </a:p>
-          <a:p>
-            <a:r>
-              <a:rPr lang="fr-FR" dirty="0"/>
-              <a:t>En regardant la documentation sur Infomaniak j’ai vu qu’il fallait mettre le chemin absolu vers le fichier où sont stockés les logins </a:t>
-            </a:r>
-          </a:p>
-          <a:p>
-            <a:r>
-              <a:rPr lang="fr-FR" dirty="0"/>
-              <a:t>J’ai dû connaître le chemin absolu de mon dossier avec une fonction </a:t>
-            </a:r>
-            <a:r>
-              <a:rPr lang="fr-FR" dirty="0" err="1"/>
-              <a:t>php</a:t>
-            </a:r>
-            <a:r>
-              <a:rPr lang="fr-FR" dirty="0"/>
-              <a:t> : </a:t>
-            </a:r>
-            <a:r>
-              <a:rPr lang="fr-CH" dirty="0" err="1"/>
-              <a:t>echo</a:t>
-            </a:r>
-            <a:r>
-              <a:rPr lang="fr-CH" dirty="0"/>
-              <a:t> </a:t>
-            </a:r>
-            <a:r>
-              <a:rPr lang="fr-CH" dirty="0" err="1"/>
-              <a:t>realpath</a:t>
-            </a:r>
-            <a:r>
-              <a:rPr lang="fr-CH" dirty="0"/>
-              <a:t>('</a:t>
-            </a:r>
-            <a:r>
-              <a:rPr lang="fr-CH" dirty="0" err="1"/>
-              <a:t>path.php</a:t>
-            </a:r>
-            <a:r>
-              <a:rPr lang="fr-CH" dirty="0"/>
-              <a:t>’);</a:t>
-            </a:r>
-          </a:p>
-          <a:p>
-            <a:r>
-              <a:rPr lang="fr-FR" dirty="0"/>
-              <a:t>Ensuite j’ai dû créer le mot de passe crypté : </a:t>
-            </a:r>
-            <a:r>
-              <a:rPr lang="fr-CH" dirty="0" err="1"/>
-              <a:t>echo</a:t>
-            </a:r>
-            <a:r>
-              <a:rPr lang="fr-CH" dirty="0"/>
-              <a:t> </a:t>
-            </a:r>
-            <a:r>
-              <a:rPr lang="fr-CH" dirty="0" err="1"/>
-              <a:t>crypt</a:t>
-            </a:r>
-            <a:r>
-              <a:rPr lang="fr-CH" dirty="0"/>
-              <a:t>('</a:t>
-            </a:r>
-            <a:r>
-              <a:rPr lang="fr-CH" dirty="0" err="1"/>
-              <a:t>mdp</a:t>
-            </a:r>
-            <a:r>
-              <a:rPr lang="fr-CH" dirty="0"/>
-              <a:t>’);</a:t>
-            </a:r>
-          </a:p>
-          <a:p>
-            <a:r>
-              <a:rPr lang="fr-FR" dirty="0"/>
-              <a:t>Créer le fichier .</a:t>
-            </a:r>
-            <a:r>
-              <a:rPr lang="fr-FR" dirty="0" err="1"/>
-              <a:t>htaccess</a:t>
-            </a:r>
-            <a:r>
-              <a:rPr lang="fr-FR" dirty="0"/>
-              <a:t> avec le chemin absolu sur mon fichier des </a:t>
-            </a:r>
-            <a:r>
-              <a:rPr lang="fr-FR" dirty="0" err="1"/>
-              <a:t>mdp</a:t>
-            </a:r>
-            <a:r>
-              <a:rPr lang="fr-FR" dirty="0"/>
-              <a:t> + login </a:t>
-            </a:r>
-          </a:p>
-          <a:p>
-            <a:endParaRPr lang="fr-FR" dirty="0"/>
-          </a:p>
-        </p:txBody>
-      </p:sp>
-      <p:sp>
-        <p:nvSpPr>
-          <p:cNvPr id="4" name="ZoneTexte 3">
-            <a:extLst>
-              <a:ext uri="{FF2B5EF4-FFF2-40B4-BE49-F238E27FC236}">
-                <a16:creationId xmlns:a16="http://schemas.microsoft.com/office/drawing/2014/main" id="{DAB237E0-DC7A-2142-B087-C9FA96C24443}"/>
-              </a:ext>
-            </a:extLst>
-          </p:cNvPr>
-          <p:cNvSpPr txBox="1"/>
-          <p:nvPr/>
-        </p:nvSpPr>
-        <p:spPr>
-          <a:xfrm>
-            <a:off x="11480799" y="6289963"/>
-            <a:ext cx="320922" cy="369332"/>
-          </a:xfrm>
-          <a:prstGeom prst="rect">
-            <a:avLst/>
-          </a:prstGeom>
-          <a:noFill/>
-        </p:spPr>
-        <p:txBody>
-          <a:bodyPr wrap="none" rtlCol="0">
-            <a:spAutoFit/>
-          </a:bodyPr>
-          <a:lstStyle/>
-          <a:p>
-            <a:r>
-              <a:rPr lang="fr-FR" dirty="0"/>
-              <a:t>5</a:t>
-            </a:r>
-          </a:p>
-        </p:txBody>
-      </p:sp>
-    </p:spTree>
-    <p:extLst>
-      <p:ext uri="{BB962C8B-B14F-4D97-AF65-F5344CB8AC3E}">
-        <p14:creationId xmlns:p14="http://schemas.microsoft.com/office/powerpoint/2010/main" val="3329647417"/>
-      </p:ext>
-    </p:extLst>
-  </p:cSld>
-  <p:clrMapOvr>
-    <a:masterClrMapping/>
-  </p:clrMapOvr>
-</p:sld>
-</file>
-
-<file path=ppt/slides/slide6.xml><?xml version="1.0" encoding="utf-8"?>
-<p:sld xmlns:a="http://schemas.openxmlformats.org/drawingml/2006/main" xmlns:r="http://schemas.openxmlformats.org/officeDocument/2006/relationships" xmlns:p="http://schemas.openxmlformats.org/presentationml/2006/main">
-  <p:cSld>
-    <p:spTree>
-      <p:nvGrpSpPr>
-        <p:cNvPr id="1" name=""/>
-        <p:cNvGrpSpPr/>
-        <p:nvPr/>
-      </p:nvGrpSpPr>
-      <p:grpSpPr>
-        <a:xfrm>
-          <a:off x="0" y="0"/>
-          <a:ext cx="0" cy="0"/>
-          <a:chOff x="0" y="0"/>
-          <a:chExt cx="0" cy="0"/>
-        </a:xfrm>
-      </p:grpSpPr>
-      <p:sp>
-        <p:nvSpPr>
-          <p:cNvPr id="2" name="Titre 1">
-            <a:extLst>
-              <a:ext uri="{FF2B5EF4-FFF2-40B4-BE49-F238E27FC236}">
-                <a16:creationId xmlns:a16="http://schemas.microsoft.com/office/drawing/2014/main" id="{DFB0DF4F-35E7-324B-B65F-FC5443FE5A58}"/>
-              </a:ext>
-            </a:extLst>
-          </p:cNvPr>
-          <p:cNvSpPr>
-            <a:spLocks noGrp="1"/>
-          </p:cNvSpPr>
-          <p:nvPr>
-            <p:ph type="title"/>
-          </p:nvPr>
-        </p:nvSpPr>
-        <p:spPr/>
-        <p:txBody>
-          <a:bodyPr/>
-          <a:lstStyle/>
-          <a:p>
-            <a:r>
-              <a:rPr lang="fr-FR" dirty="0"/>
-              <a:t>Entretien avec le client </a:t>
-            </a:r>
-          </a:p>
-        </p:txBody>
-      </p:sp>
-      <p:sp>
-        <p:nvSpPr>
-          <p:cNvPr id="3" name="Espace réservé du contenu 2">
-            <a:extLst>
-              <a:ext uri="{FF2B5EF4-FFF2-40B4-BE49-F238E27FC236}">
-                <a16:creationId xmlns:a16="http://schemas.microsoft.com/office/drawing/2014/main" id="{15477CC0-CA05-F344-93E7-4BEDFEF7C8BE}"/>
-              </a:ext>
-            </a:extLst>
-          </p:cNvPr>
-          <p:cNvSpPr>
-            <a:spLocks noGrp="1"/>
-          </p:cNvSpPr>
-          <p:nvPr>
-            <p:ph idx="1"/>
-          </p:nvPr>
-        </p:nvSpPr>
-        <p:spPr/>
-        <p:txBody>
-          <a:bodyPr>
-            <a:normAutofit/>
-          </a:bodyPr>
-          <a:lstStyle/>
-          <a:p>
-            <a:r>
-              <a:rPr lang="fr-FR" dirty="0"/>
-              <a:t>Ajout du compte du M. Louis Pache dans le fichier .</a:t>
-            </a:r>
-            <a:r>
-              <a:rPr lang="fr-FR" dirty="0" err="1"/>
-              <a:t>htpassword</a:t>
-            </a:r>
-            <a:endParaRPr lang="fr-FR" dirty="0"/>
-          </a:p>
-          <a:p>
-            <a:pPr lvl="1"/>
-            <a:r>
-              <a:rPr lang="fr-FR" dirty="0"/>
-              <a:t>Il pourra se connecter dessus avec sur le site </a:t>
-            </a:r>
-          </a:p>
-          <a:p>
-            <a:r>
-              <a:rPr lang="fr-FR" dirty="0"/>
-              <a:t>Installation de </a:t>
-            </a:r>
-            <a:r>
-              <a:rPr lang="fr-FR" dirty="0" err="1"/>
-              <a:t>Ionic</a:t>
-            </a:r>
-            <a:r>
-              <a:rPr lang="fr-FR" dirty="0"/>
-              <a:t> </a:t>
-            </a:r>
-            <a:r>
-              <a:rPr lang="fr-FR" dirty="0" err="1"/>
-              <a:t>View</a:t>
-            </a:r>
-            <a:r>
-              <a:rPr lang="fr-FR" dirty="0"/>
-              <a:t> pour l’application mobile </a:t>
-            </a:r>
-          </a:p>
-          <a:p>
-            <a:pPr lvl="1"/>
-            <a:r>
-              <a:rPr lang="fr-FR" dirty="0"/>
-              <a:t>Entrer le code de l’application pour qu’il l’ait dans la liste </a:t>
-            </a:r>
-          </a:p>
-          <a:p>
-            <a:r>
-              <a:rPr lang="fr-FR" dirty="0"/>
-              <a:t>Explication du fonctionnement de l’application</a:t>
-            </a:r>
-          </a:p>
-          <a:p>
-            <a:r>
-              <a:rPr lang="fr-FR" dirty="0"/>
-              <a:t>Explication du fonctionnement du site </a:t>
-            </a:r>
-          </a:p>
-          <a:p>
-            <a:r>
-              <a:rPr lang="fr-FR" dirty="0"/>
-              <a:t>Il fera des tests avec la base de données actuels, quand il aura suffisamment pris la main sur le site et l’application je lui remettrai une BD vierge</a:t>
-            </a:r>
-          </a:p>
-          <a:p>
-            <a:r>
-              <a:rPr lang="fr-FR" dirty="0"/>
-              <a:t>Après les tests qu’il aura fait il me dira les bugs qu’il trouvera et je ferai ensuite les changements </a:t>
-            </a:r>
-            <a:r>
-              <a:rPr lang="fr-FR" dirty="0" err="1"/>
-              <a:t>adécuats</a:t>
-            </a:r>
-            <a:r>
-              <a:rPr lang="fr-FR" dirty="0"/>
-              <a:t> </a:t>
-            </a:r>
-          </a:p>
-        </p:txBody>
-      </p:sp>
-      <p:sp>
-        <p:nvSpPr>
-          <p:cNvPr id="4" name="ZoneTexte 3">
-            <a:extLst>
-              <a:ext uri="{FF2B5EF4-FFF2-40B4-BE49-F238E27FC236}">
-                <a16:creationId xmlns:a16="http://schemas.microsoft.com/office/drawing/2014/main" id="{D461D988-6C99-7C4E-9800-FF4E410A7027}"/>
-              </a:ext>
-            </a:extLst>
-          </p:cNvPr>
-          <p:cNvSpPr txBox="1"/>
-          <p:nvPr/>
-        </p:nvSpPr>
-        <p:spPr>
-          <a:xfrm>
-            <a:off x="11480799" y="6289963"/>
-            <a:ext cx="320922" cy="369332"/>
-          </a:xfrm>
-          <a:prstGeom prst="rect">
-            <a:avLst/>
-          </a:prstGeom>
-          <a:noFill/>
-        </p:spPr>
-        <p:txBody>
-          <a:bodyPr wrap="none" rtlCol="0">
-            <a:spAutoFit/>
-          </a:bodyPr>
-          <a:lstStyle/>
-          <a:p>
-            <a:r>
-              <a:rPr lang="fr-FR" dirty="0"/>
-              <a:t>6</a:t>
-            </a:r>
-          </a:p>
-        </p:txBody>
-      </p:sp>
-    </p:spTree>
-    <p:extLst>
-      <p:ext uri="{BB962C8B-B14F-4D97-AF65-F5344CB8AC3E}">
-        <p14:creationId xmlns:p14="http://schemas.microsoft.com/office/powerpoint/2010/main" val="2737234727"/>
-      </p:ext>
-    </p:extLst>
-  </p:cSld>
-  <p:clrMapOvr>
-    <a:masterClrMapping/>
-  </p:clrMapOvr>
-</p:sld>
-</file>
-
-<file path=ppt/slides/slide7.xml><?xml version="1.0" encoding="utf-8"?>
-<p:sld xmlns:a="http://schemas.openxmlformats.org/drawingml/2006/main" xmlns:r="http://schemas.openxmlformats.org/officeDocument/2006/relationships" xmlns:p="http://schemas.openxmlformats.org/presentationml/2006/main">
-  <p:cSld>
-    <p:spTree>
-      <p:nvGrpSpPr>
-        <p:cNvPr id="1" name=""/>
-        <p:cNvGrpSpPr/>
-        <p:nvPr/>
-      </p:nvGrpSpPr>
-      <p:grpSpPr>
-        <a:xfrm>
-          <a:off x="0" y="0"/>
-          <a:ext cx="0" cy="0"/>
-          <a:chOff x="0" y="0"/>
-          <a:chExt cx="0" cy="0"/>
-        </a:xfrm>
-      </p:grpSpPr>
-      <p:sp>
-        <p:nvSpPr>
-          <p:cNvPr id="2" name="Titre 1">
-            <a:extLst>
-              <a:ext uri="{FF2B5EF4-FFF2-40B4-BE49-F238E27FC236}">
                 <a16:creationId xmlns:a16="http://schemas.microsoft.com/office/drawing/2014/main" id="{DEDF04B0-5015-C243-8D07-5B2CAB4B33AA}"/>
               </a:ext>
             </a:extLst>
@@ -6013,7 +4906,7 @@
 </p:sld>
 </file>
 
-<file path=ppt/slides/slide8.xml><?xml version="1.0" encoding="utf-8"?>
+<file path=ppt/slides/slide13.xml><?xml version="1.0" encoding="utf-8"?>
 <p:sld xmlns:a="http://schemas.openxmlformats.org/drawingml/2006/main" xmlns:r="http://schemas.openxmlformats.org/officeDocument/2006/relationships" xmlns:p="http://schemas.openxmlformats.org/presentationml/2006/main">
   <p:cSld>
     <p:spTree>
@@ -6229,7 +5122,7 @@
 </p:sld>
 </file>
 
-<file path=ppt/slides/slide9.xml><?xml version="1.0" encoding="utf-8"?>
+<file path=ppt/slides/slide14.xml><?xml version="1.0" encoding="utf-8"?>
 <p:sld xmlns:a="http://schemas.openxmlformats.org/drawingml/2006/main" xmlns:r="http://schemas.openxmlformats.org/officeDocument/2006/relationships" xmlns:p="http://schemas.openxmlformats.org/presentationml/2006/main">
   <p:cSld>
     <p:spTree>
@@ -6441,6 +5334,2775 @@
     <p:extLst>
       <p:ext uri="{BB962C8B-B14F-4D97-AF65-F5344CB8AC3E}">
         <p14:creationId xmlns:p14="http://schemas.microsoft.com/office/powerpoint/2010/main" val="4091710115"/>
+      </p:ext>
+    </p:extLst>
+  </p:cSld>
+  <p:clrMapOvr>
+    <a:masterClrMapping/>
+  </p:clrMapOvr>
+</p:sld>
+</file>
+
+<file path=ppt/slides/slide15.xml><?xml version="1.0" encoding="utf-8"?>
+<p:sld xmlns:a="http://schemas.openxmlformats.org/drawingml/2006/main" xmlns:r="http://schemas.openxmlformats.org/officeDocument/2006/relationships" xmlns:p="http://schemas.openxmlformats.org/presentationml/2006/main">
+  <p:cSld>
+    <p:spTree>
+      <p:nvGrpSpPr>
+        <p:cNvPr id="1" name=""/>
+        <p:cNvGrpSpPr/>
+        <p:nvPr/>
+      </p:nvGrpSpPr>
+      <p:grpSpPr>
+        <a:xfrm>
+          <a:off x="0" y="0"/>
+          <a:ext cx="0" cy="0"/>
+          <a:chOff x="0" y="0"/>
+          <a:chExt cx="0" cy="0"/>
+        </a:xfrm>
+      </p:grpSpPr>
+      <p:sp>
+        <p:nvSpPr>
+          <p:cNvPr id="2" name="Titre 1">
+            <a:extLst>
+              <a:ext uri="{FF2B5EF4-FFF2-40B4-BE49-F238E27FC236}">
+                <a16:creationId xmlns:a16="http://schemas.microsoft.com/office/drawing/2014/main" id="{9B8AD4FD-586B-BE4F-998B-B7E4791A1369}"/>
+              </a:ext>
+            </a:extLst>
+          </p:cNvPr>
+          <p:cNvSpPr>
+            <a:spLocks noGrp="1"/>
+          </p:cNvSpPr>
+          <p:nvPr>
+            <p:ph type="title"/>
+          </p:nvPr>
+        </p:nvSpPr>
+        <p:spPr/>
+        <p:txBody>
+          <a:bodyPr/>
+          <a:lstStyle/>
+          <a:p>
+            <a:endParaRPr lang="fr-FR"/>
+          </a:p>
+        </p:txBody>
+      </p:sp>
+      <p:pic>
+        <p:nvPicPr>
+          <p:cNvPr id="5" name="Espace réservé du contenu 4">
+            <a:extLst>
+              <a:ext uri="{FF2B5EF4-FFF2-40B4-BE49-F238E27FC236}">
+                <a16:creationId xmlns:a16="http://schemas.microsoft.com/office/drawing/2014/main" id="{A15FD77F-FB94-9647-B51F-9460DAB4FAFA}"/>
+              </a:ext>
+            </a:extLst>
+          </p:cNvPr>
+          <p:cNvPicPr>
+            <a:picLocks noGrp="1" noChangeAspect="1"/>
+          </p:cNvPicPr>
+          <p:nvPr>
+            <p:ph idx="1"/>
+          </p:nvPr>
+        </p:nvPicPr>
+        <p:blipFill>
+          <a:blip r:embed="rId2"/>
+          <a:stretch>
+            <a:fillRect/>
+          </a:stretch>
+        </p:blipFill>
+        <p:spPr>
+          <a:xfrm>
+            <a:off x="4355561" y="291233"/>
+            <a:ext cx="3480877" cy="6191321"/>
+          </a:xfrm>
+        </p:spPr>
+      </p:pic>
+      <p:sp>
+        <p:nvSpPr>
+          <p:cNvPr id="4" name="ZoneTexte 3">
+            <a:extLst>
+              <a:ext uri="{FF2B5EF4-FFF2-40B4-BE49-F238E27FC236}">
+                <a16:creationId xmlns:a16="http://schemas.microsoft.com/office/drawing/2014/main" id="{63C15B25-0680-6643-8404-70E2E53F6F2B}"/>
+              </a:ext>
+            </a:extLst>
+          </p:cNvPr>
+          <p:cNvSpPr txBox="1"/>
+          <p:nvPr/>
+        </p:nvSpPr>
+        <p:spPr>
+          <a:xfrm>
+            <a:off x="11406908" y="6297888"/>
+            <a:ext cx="457176" cy="369332"/>
+          </a:xfrm>
+          <a:prstGeom prst="rect">
+            <a:avLst/>
+          </a:prstGeom>
+          <a:noFill/>
+        </p:spPr>
+        <p:txBody>
+          <a:bodyPr wrap="none" rtlCol="0">
+            <a:spAutoFit/>
+          </a:bodyPr>
+          <a:lstStyle/>
+          <a:p>
+            <a:r>
+              <a:rPr lang="fr-FR" dirty="0"/>
+              <a:t>10</a:t>
+            </a:r>
+          </a:p>
+        </p:txBody>
+      </p:sp>
+    </p:spTree>
+    <p:extLst>
+      <p:ext uri="{BB962C8B-B14F-4D97-AF65-F5344CB8AC3E}">
+        <p14:creationId xmlns:p14="http://schemas.microsoft.com/office/powerpoint/2010/main" val="2552274360"/>
+      </p:ext>
+    </p:extLst>
+  </p:cSld>
+  <p:clrMapOvr>
+    <a:masterClrMapping/>
+  </p:clrMapOvr>
+</p:sld>
+</file>
+
+<file path=ppt/slides/slide16.xml><?xml version="1.0" encoding="utf-8"?>
+<p:sld xmlns:a="http://schemas.openxmlformats.org/drawingml/2006/main" xmlns:r="http://schemas.openxmlformats.org/officeDocument/2006/relationships" xmlns:p="http://schemas.openxmlformats.org/presentationml/2006/main">
+  <p:cSld>
+    <p:spTree>
+      <p:nvGrpSpPr>
+        <p:cNvPr id="1" name=""/>
+        <p:cNvGrpSpPr/>
+        <p:nvPr/>
+      </p:nvGrpSpPr>
+      <p:grpSpPr>
+        <a:xfrm>
+          <a:off x="0" y="0"/>
+          <a:ext cx="0" cy="0"/>
+          <a:chOff x="0" y="0"/>
+          <a:chExt cx="0" cy="0"/>
+        </a:xfrm>
+      </p:grpSpPr>
+      <p:sp>
+        <p:nvSpPr>
+          <p:cNvPr id="2" name="Titre 1">
+            <a:extLst>
+              <a:ext uri="{FF2B5EF4-FFF2-40B4-BE49-F238E27FC236}">
+                <a16:creationId xmlns:a16="http://schemas.microsoft.com/office/drawing/2014/main" id="{E070BD1A-F734-004D-8050-6B841AA1C839}"/>
+              </a:ext>
+            </a:extLst>
+          </p:cNvPr>
+          <p:cNvSpPr>
+            <a:spLocks noGrp="1"/>
+          </p:cNvSpPr>
+          <p:nvPr>
+            <p:ph type="title"/>
+          </p:nvPr>
+        </p:nvSpPr>
+        <p:spPr/>
+        <p:txBody>
+          <a:bodyPr/>
+          <a:lstStyle/>
+          <a:p>
+            <a:r>
+              <a:rPr lang="fr-FR" dirty="0"/>
+              <a:t>Déroulement</a:t>
+            </a:r>
+          </a:p>
+        </p:txBody>
+      </p:sp>
+      <p:sp>
+        <p:nvSpPr>
+          <p:cNvPr id="4" name="Rectangle à coins arrondis 3">
+            <a:extLst>
+              <a:ext uri="{FF2B5EF4-FFF2-40B4-BE49-F238E27FC236}">
+                <a16:creationId xmlns:a16="http://schemas.microsoft.com/office/drawing/2014/main" id="{5B325F03-6E49-054A-905C-229B8AB7FA24}"/>
+              </a:ext>
+            </a:extLst>
+          </p:cNvPr>
+          <p:cNvSpPr/>
+          <p:nvPr/>
+        </p:nvSpPr>
+        <p:spPr>
+          <a:xfrm>
+            <a:off x="663448" y="2675868"/>
+            <a:ext cx="2966443" cy="2265587"/>
+          </a:xfrm>
+          <a:prstGeom prst="roundRect">
+            <a:avLst/>
+          </a:prstGeom>
+        </p:spPr>
+        <p:style>
+          <a:lnRef idx="2">
+            <a:schemeClr val="dk1">
+              <a:shade val="50000"/>
+            </a:schemeClr>
+          </a:lnRef>
+          <a:fillRef idx="1">
+            <a:schemeClr val="dk1"/>
+          </a:fillRef>
+          <a:effectRef idx="0">
+            <a:schemeClr val="dk1"/>
+          </a:effectRef>
+          <a:fontRef idx="minor">
+            <a:schemeClr val="lt1"/>
+          </a:fontRef>
+        </p:style>
+        <p:txBody>
+          <a:bodyPr rtlCol="0" anchor="ctr"/>
+          <a:lstStyle/>
+          <a:p>
+            <a:pPr algn="ctr"/>
+            <a:r>
+              <a:rPr lang="fr-FR" dirty="0"/>
+              <a:t>Introduction</a:t>
+            </a:r>
+          </a:p>
+        </p:txBody>
+      </p:sp>
+      <p:sp>
+        <p:nvSpPr>
+          <p:cNvPr id="5" name="Rectangle à coins arrondis 4">
+            <a:extLst>
+              <a:ext uri="{FF2B5EF4-FFF2-40B4-BE49-F238E27FC236}">
+                <a16:creationId xmlns:a16="http://schemas.microsoft.com/office/drawing/2014/main" id="{455A8A4E-9290-E748-98D6-FAD839D8E76B}"/>
+              </a:ext>
+            </a:extLst>
+          </p:cNvPr>
+          <p:cNvSpPr/>
+          <p:nvPr/>
+        </p:nvSpPr>
+        <p:spPr>
+          <a:xfrm>
+            <a:off x="4607375" y="2675867"/>
+            <a:ext cx="2966443" cy="2265587"/>
+          </a:xfrm>
+          <a:prstGeom prst="roundRect">
+            <a:avLst/>
+          </a:prstGeom>
+        </p:spPr>
+        <p:style>
+          <a:lnRef idx="2">
+            <a:schemeClr val="dk1">
+              <a:shade val="50000"/>
+            </a:schemeClr>
+          </a:lnRef>
+          <a:fillRef idx="1">
+            <a:schemeClr val="dk1"/>
+          </a:fillRef>
+          <a:effectRef idx="0">
+            <a:schemeClr val="dk1"/>
+          </a:effectRef>
+          <a:fontRef idx="minor">
+            <a:schemeClr val="lt1"/>
+          </a:fontRef>
+        </p:style>
+        <p:txBody>
+          <a:bodyPr rtlCol="0" anchor="ctr"/>
+          <a:lstStyle/>
+          <a:p>
+            <a:pPr algn="ctr"/>
+            <a:r>
+              <a:rPr lang="fr-FR" dirty="0"/>
+              <a:t>Développement</a:t>
+            </a:r>
+          </a:p>
+        </p:txBody>
+      </p:sp>
+      <p:sp>
+        <p:nvSpPr>
+          <p:cNvPr id="6" name="Rectangle à coins arrondis 5">
+            <a:extLst>
+              <a:ext uri="{FF2B5EF4-FFF2-40B4-BE49-F238E27FC236}">
+                <a16:creationId xmlns:a16="http://schemas.microsoft.com/office/drawing/2014/main" id="{67A4D9A3-B83A-DF4A-9E34-A0EE7F640B95}"/>
+              </a:ext>
+            </a:extLst>
+          </p:cNvPr>
+          <p:cNvSpPr/>
+          <p:nvPr/>
+        </p:nvSpPr>
+        <p:spPr>
+          <a:xfrm>
+            <a:off x="8551303" y="2675868"/>
+            <a:ext cx="2966443" cy="2265587"/>
+          </a:xfrm>
+          <a:prstGeom prst="roundRect">
+            <a:avLst/>
+          </a:prstGeom>
+        </p:spPr>
+        <p:style>
+          <a:lnRef idx="2">
+            <a:schemeClr val="accent1">
+              <a:shade val="50000"/>
+            </a:schemeClr>
+          </a:lnRef>
+          <a:fillRef idx="1">
+            <a:schemeClr val="accent1"/>
+          </a:fillRef>
+          <a:effectRef idx="0">
+            <a:schemeClr val="accent1"/>
+          </a:effectRef>
+          <a:fontRef idx="minor">
+            <a:schemeClr val="lt1"/>
+          </a:fontRef>
+        </p:style>
+        <p:txBody>
+          <a:bodyPr rtlCol="0" anchor="ctr"/>
+          <a:lstStyle/>
+          <a:p>
+            <a:pPr algn="ctr"/>
+            <a:r>
+              <a:rPr lang="fr-FR" dirty="0"/>
+              <a:t>Conclusion</a:t>
+            </a:r>
+          </a:p>
+        </p:txBody>
+      </p:sp>
+    </p:spTree>
+    <p:extLst>
+      <p:ext uri="{BB962C8B-B14F-4D97-AF65-F5344CB8AC3E}">
+        <p14:creationId xmlns:p14="http://schemas.microsoft.com/office/powerpoint/2010/main" val="1793566351"/>
+      </p:ext>
+    </p:extLst>
+  </p:cSld>
+  <p:clrMapOvr>
+    <a:masterClrMapping/>
+  </p:clrMapOvr>
+</p:sld>
+</file>
+
+<file path=ppt/slides/slide17.xml><?xml version="1.0" encoding="utf-8"?>
+<p:sld xmlns:a="http://schemas.openxmlformats.org/drawingml/2006/main" xmlns:r="http://schemas.openxmlformats.org/officeDocument/2006/relationships" xmlns:p="http://schemas.openxmlformats.org/presentationml/2006/main">
+  <p:cSld>
+    <p:spTree>
+      <p:nvGrpSpPr>
+        <p:cNvPr id="1" name=""/>
+        <p:cNvGrpSpPr/>
+        <p:nvPr/>
+      </p:nvGrpSpPr>
+      <p:grpSpPr>
+        <a:xfrm>
+          <a:off x="0" y="0"/>
+          <a:ext cx="0" cy="0"/>
+          <a:chOff x="0" y="0"/>
+          <a:chExt cx="0" cy="0"/>
+        </a:xfrm>
+      </p:grpSpPr>
+      <p:sp>
+        <p:nvSpPr>
+          <p:cNvPr id="2" name="Titre 1">
+            <a:extLst>
+              <a:ext uri="{FF2B5EF4-FFF2-40B4-BE49-F238E27FC236}">
+                <a16:creationId xmlns:a16="http://schemas.microsoft.com/office/drawing/2014/main" id="{113484F7-246E-4B4F-8622-DDF8EEDBD389}"/>
+              </a:ext>
+            </a:extLst>
+          </p:cNvPr>
+          <p:cNvSpPr>
+            <a:spLocks noGrp="1"/>
+          </p:cNvSpPr>
+          <p:nvPr>
+            <p:ph type="title"/>
+          </p:nvPr>
+        </p:nvSpPr>
+        <p:spPr/>
+        <p:txBody>
+          <a:bodyPr/>
+          <a:lstStyle/>
+          <a:p>
+            <a:r>
+              <a:rPr lang="fr-FR" dirty="0"/>
+              <a:t>Difficultés rencontrées</a:t>
+            </a:r>
+          </a:p>
+        </p:txBody>
+      </p:sp>
+      <p:sp>
+        <p:nvSpPr>
+          <p:cNvPr id="3" name="Espace réservé du contenu 2">
+            <a:extLst>
+              <a:ext uri="{FF2B5EF4-FFF2-40B4-BE49-F238E27FC236}">
+                <a16:creationId xmlns:a16="http://schemas.microsoft.com/office/drawing/2014/main" id="{24DAE48B-6DF2-5548-9109-AE2164F4DA9B}"/>
+              </a:ext>
+            </a:extLst>
+          </p:cNvPr>
+          <p:cNvSpPr>
+            <a:spLocks noGrp="1"/>
+          </p:cNvSpPr>
+          <p:nvPr>
+            <p:ph idx="1"/>
+          </p:nvPr>
+        </p:nvSpPr>
+        <p:spPr/>
+        <p:txBody>
+          <a:bodyPr/>
+          <a:lstStyle/>
+          <a:p>
+            <a:r>
+              <a:rPr lang="fr-FR" dirty="0"/>
+              <a:t>Gros changement dans la base de données le vendredi avant de rendre le TPI</a:t>
+            </a:r>
+          </a:p>
+          <a:p>
+            <a:r>
+              <a:rPr lang="fr-FR" dirty="0"/>
+              <a:t>Refaire la moitié des fonctions sur le site ainsi que sur l’application mobile </a:t>
+            </a:r>
+          </a:p>
+          <a:p>
+            <a:r>
+              <a:rPr lang="fr-FR" dirty="0"/>
+              <a:t>Quantité calculée différemment pour chaque millésime </a:t>
+            </a:r>
+          </a:p>
+          <a:p>
+            <a:endParaRPr lang="fr-FR" dirty="0"/>
+          </a:p>
+        </p:txBody>
+      </p:sp>
+      <p:sp>
+        <p:nvSpPr>
+          <p:cNvPr id="4" name="ZoneTexte 3">
+            <a:extLst>
+              <a:ext uri="{FF2B5EF4-FFF2-40B4-BE49-F238E27FC236}">
+                <a16:creationId xmlns:a16="http://schemas.microsoft.com/office/drawing/2014/main" id="{1FF094D3-3976-D34E-8F62-C3C0E6D70E94}"/>
+              </a:ext>
+            </a:extLst>
+          </p:cNvPr>
+          <p:cNvSpPr txBox="1"/>
+          <p:nvPr/>
+        </p:nvSpPr>
+        <p:spPr>
+          <a:xfrm>
+            <a:off x="11406908" y="6297888"/>
+            <a:ext cx="457176" cy="369332"/>
+          </a:xfrm>
+          <a:prstGeom prst="rect">
+            <a:avLst/>
+          </a:prstGeom>
+          <a:noFill/>
+        </p:spPr>
+        <p:txBody>
+          <a:bodyPr wrap="none" rtlCol="0">
+            <a:spAutoFit/>
+          </a:bodyPr>
+          <a:lstStyle/>
+          <a:p>
+            <a:r>
+              <a:rPr lang="fr-FR" dirty="0"/>
+              <a:t>11</a:t>
+            </a:r>
+          </a:p>
+        </p:txBody>
+      </p:sp>
+    </p:spTree>
+    <p:extLst>
+      <p:ext uri="{BB962C8B-B14F-4D97-AF65-F5344CB8AC3E}">
+        <p14:creationId xmlns:p14="http://schemas.microsoft.com/office/powerpoint/2010/main" val="3377292038"/>
+      </p:ext>
+    </p:extLst>
+  </p:cSld>
+  <p:clrMapOvr>
+    <a:masterClrMapping/>
+  </p:clrMapOvr>
+</p:sld>
+</file>
+
+<file path=ppt/slides/slide18.xml><?xml version="1.0" encoding="utf-8"?>
+<p:sld xmlns:a="http://schemas.openxmlformats.org/drawingml/2006/main" xmlns:r="http://schemas.openxmlformats.org/officeDocument/2006/relationships" xmlns:p="http://schemas.openxmlformats.org/presentationml/2006/main">
+  <p:cSld>
+    <p:spTree>
+      <p:nvGrpSpPr>
+        <p:cNvPr id="1" name=""/>
+        <p:cNvGrpSpPr/>
+        <p:nvPr/>
+      </p:nvGrpSpPr>
+      <p:grpSpPr>
+        <a:xfrm>
+          <a:off x="0" y="0"/>
+          <a:ext cx="0" cy="0"/>
+          <a:chOff x="0" y="0"/>
+          <a:chExt cx="0" cy="0"/>
+        </a:xfrm>
+      </p:grpSpPr>
+      <p:sp>
+        <p:nvSpPr>
+          <p:cNvPr id="2" name="Titre 1">
+            <a:extLst>
+              <a:ext uri="{FF2B5EF4-FFF2-40B4-BE49-F238E27FC236}">
+                <a16:creationId xmlns:a16="http://schemas.microsoft.com/office/drawing/2014/main" id="{F0EEA0CA-3B16-D14F-8FC8-2069CE075D37}"/>
+              </a:ext>
+            </a:extLst>
+          </p:cNvPr>
+          <p:cNvSpPr>
+            <a:spLocks noGrp="1"/>
+          </p:cNvSpPr>
+          <p:nvPr>
+            <p:ph type="title"/>
+          </p:nvPr>
+        </p:nvSpPr>
+        <p:spPr/>
+        <p:txBody>
+          <a:bodyPr/>
+          <a:lstStyle/>
+          <a:p>
+            <a:r>
+              <a:rPr lang="fr-FR" dirty="0"/>
+              <a:t>Améliorations</a:t>
+            </a:r>
+          </a:p>
+        </p:txBody>
+      </p:sp>
+      <p:sp>
+        <p:nvSpPr>
+          <p:cNvPr id="3" name="Espace réservé du contenu 2">
+            <a:extLst>
+              <a:ext uri="{FF2B5EF4-FFF2-40B4-BE49-F238E27FC236}">
+                <a16:creationId xmlns:a16="http://schemas.microsoft.com/office/drawing/2014/main" id="{04EE4C1D-CCA0-E04B-A878-8ECCE60137BF}"/>
+              </a:ext>
+            </a:extLst>
+          </p:cNvPr>
+          <p:cNvSpPr>
+            <a:spLocks noGrp="1"/>
+          </p:cNvSpPr>
+          <p:nvPr>
+            <p:ph idx="1"/>
+          </p:nvPr>
+        </p:nvSpPr>
+        <p:spPr/>
+        <p:txBody>
+          <a:bodyPr/>
+          <a:lstStyle/>
+          <a:p>
+            <a:r>
+              <a:rPr lang="fr-FR" dirty="0"/>
+              <a:t>Page permettant de créer des utilisateurs ainsi qu’un mot de passe crypté</a:t>
+            </a:r>
+          </a:p>
+          <a:p>
+            <a:r>
+              <a:rPr lang="fr-FR" dirty="0"/>
+              <a:t>Page de login sur l’application mobile </a:t>
+            </a:r>
+          </a:p>
+          <a:p>
+            <a:endParaRPr lang="fr-FR" dirty="0"/>
+          </a:p>
+          <a:p>
+            <a:endParaRPr lang="fr-FR" dirty="0"/>
+          </a:p>
+          <a:p>
+            <a:endParaRPr lang="fr-FR" dirty="0"/>
+          </a:p>
+        </p:txBody>
+      </p:sp>
+      <p:sp>
+        <p:nvSpPr>
+          <p:cNvPr id="4" name="ZoneTexte 3">
+            <a:extLst>
+              <a:ext uri="{FF2B5EF4-FFF2-40B4-BE49-F238E27FC236}">
+                <a16:creationId xmlns:a16="http://schemas.microsoft.com/office/drawing/2014/main" id="{606F2F88-F5E1-3A45-AE9A-E264E472064C}"/>
+              </a:ext>
+            </a:extLst>
+          </p:cNvPr>
+          <p:cNvSpPr txBox="1"/>
+          <p:nvPr/>
+        </p:nvSpPr>
+        <p:spPr>
+          <a:xfrm>
+            <a:off x="11406908" y="6297888"/>
+            <a:ext cx="457176" cy="369332"/>
+          </a:xfrm>
+          <a:prstGeom prst="rect">
+            <a:avLst/>
+          </a:prstGeom>
+          <a:noFill/>
+        </p:spPr>
+        <p:txBody>
+          <a:bodyPr wrap="none" rtlCol="0">
+            <a:spAutoFit/>
+          </a:bodyPr>
+          <a:lstStyle/>
+          <a:p>
+            <a:r>
+              <a:rPr lang="fr-FR" dirty="0"/>
+              <a:t>12</a:t>
+            </a:r>
+          </a:p>
+        </p:txBody>
+      </p:sp>
+    </p:spTree>
+    <p:extLst>
+      <p:ext uri="{BB962C8B-B14F-4D97-AF65-F5344CB8AC3E}">
+        <p14:creationId xmlns:p14="http://schemas.microsoft.com/office/powerpoint/2010/main" val="3966416713"/>
+      </p:ext>
+    </p:extLst>
+  </p:cSld>
+  <p:clrMapOvr>
+    <a:masterClrMapping/>
+  </p:clrMapOvr>
+</p:sld>
+</file>
+
+<file path=ppt/slides/slide19.xml><?xml version="1.0" encoding="utf-8"?>
+<p:sld xmlns:a="http://schemas.openxmlformats.org/drawingml/2006/main" xmlns:r="http://schemas.openxmlformats.org/officeDocument/2006/relationships" xmlns:p="http://schemas.openxmlformats.org/presentationml/2006/main">
+  <p:cSld>
+    <p:spTree>
+      <p:nvGrpSpPr>
+        <p:cNvPr id="1" name=""/>
+        <p:cNvGrpSpPr/>
+        <p:nvPr/>
+      </p:nvGrpSpPr>
+      <p:grpSpPr>
+        <a:xfrm>
+          <a:off x="0" y="0"/>
+          <a:ext cx="0" cy="0"/>
+          <a:chOff x="0" y="0"/>
+          <a:chExt cx="0" cy="0"/>
+        </a:xfrm>
+      </p:grpSpPr>
+      <p:sp>
+        <p:nvSpPr>
+          <p:cNvPr id="2" name="Titre 1">
+            <a:extLst>
+              <a:ext uri="{FF2B5EF4-FFF2-40B4-BE49-F238E27FC236}">
+                <a16:creationId xmlns:a16="http://schemas.microsoft.com/office/drawing/2014/main" id="{EFAF7BC5-DCD3-A14B-B2DC-605CFAE91FD0}"/>
+              </a:ext>
+            </a:extLst>
+          </p:cNvPr>
+          <p:cNvSpPr>
+            <a:spLocks noGrp="1"/>
+          </p:cNvSpPr>
+          <p:nvPr>
+            <p:ph type="title"/>
+          </p:nvPr>
+        </p:nvSpPr>
+        <p:spPr/>
+        <p:txBody>
+          <a:bodyPr/>
+          <a:lstStyle/>
+          <a:p>
+            <a:r>
+              <a:rPr lang="fr-FR" dirty="0"/>
+              <a:t>Points positifs</a:t>
+            </a:r>
+          </a:p>
+        </p:txBody>
+      </p:sp>
+      <p:sp>
+        <p:nvSpPr>
+          <p:cNvPr id="3" name="Espace réservé du contenu 2">
+            <a:extLst>
+              <a:ext uri="{FF2B5EF4-FFF2-40B4-BE49-F238E27FC236}">
+                <a16:creationId xmlns:a16="http://schemas.microsoft.com/office/drawing/2014/main" id="{6950E3C6-DEC8-D84A-B8D3-01DD72CA2F8A}"/>
+              </a:ext>
+            </a:extLst>
+          </p:cNvPr>
+          <p:cNvSpPr>
+            <a:spLocks noGrp="1"/>
+          </p:cNvSpPr>
+          <p:nvPr>
+            <p:ph idx="1"/>
+          </p:nvPr>
+        </p:nvSpPr>
+        <p:spPr/>
+        <p:txBody>
+          <a:bodyPr/>
+          <a:lstStyle/>
+          <a:p>
+            <a:r>
+              <a:rPr lang="fr-FR" dirty="0"/>
+              <a:t>Apprentissage approfondit avec </a:t>
+            </a:r>
+            <a:r>
+              <a:rPr lang="fr-FR" dirty="0" err="1"/>
+              <a:t>ionic</a:t>
+            </a:r>
+            <a:r>
+              <a:rPr lang="fr-FR" dirty="0"/>
+              <a:t> </a:t>
+            </a:r>
+          </a:p>
+          <a:p>
+            <a:r>
+              <a:rPr lang="fr-FR" dirty="0"/>
+              <a:t>Apprentissage de nouvelles fonctions en PHP</a:t>
+            </a:r>
+          </a:p>
+          <a:p>
+            <a:r>
+              <a:rPr lang="fr-FR" dirty="0"/>
+              <a:t>Le stresse pour finir tout à temps</a:t>
+            </a:r>
+          </a:p>
+          <a:p>
+            <a:r>
+              <a:rPr lang="fr-FR" dirty="0"/>
+              <a:t>Le client </a:t>
+            </a:r>
+          </a:p>
+          <a:p>
+            <a:r>
+              <a:rPr lang="fr-FR" dirty="0"/>
+              <a:t>Faire un projet concret qui sera utilisé </a:t>
+            </a:r>
+          </a:p>
+          <a:p>
+            <a:endParaRPr lang="fr-FR" dirty="0"/>
+          </a:p>
+          <a:p>
+            <a:endParaRPr lang="fr-FR" dirty="0"/>
+          </a:p>
+          <a:p>
+            <a:endParaRPr lang="fr-FR" dirty="0"/>
+          </a:p>
+          <a:p>
+            <a:endParaRPr lang="fr-FR" dirty="0"/>
+          </a:p>
+        </p:txBody>
+      </p:sp>
+      <p:sp>
+        <p:nvSpPr>
+          <p:cNvPr id="4" name="ZoneTexte 3">
+            <a:extLst>
+              <a:ext uri="{FF2B5EF4-FFF2-40B4-BE49-F238E27FC236}">
+                <a16:creationId xmlns:a16="http://schemas.microsoft.com/office/drawing/2014/main" id="{BE8C7BE7-4894-4940-9575-A47B9ECC3D90}"/>
+              </a:ext>
+            </a:extLst>
+          </p:cNvPr>
+          <p:cNvSpPr txBox="1"/>
+          <p:nvPr/>
+        </p:nvSpPr>
+        <p:spPr>
+          <a:xfrm>
+            <a:off x="11406908" y="6297888"/>
+            <a:ext cx="457176" cy="369332"/>
+          </a:xfrm>
+          <a:prstGeom prst="rect">
+            <a:avLst/>
+          </a:prstGeom>
+          <a:noFill/>
+        </p:spPr>
+        <p:txBody>
+          <a:bodyPr wrap="none" rtlCol="0">
+            <a:spAutoFit/>
+          </a:bodyPr>
+          <a:lstStyle/>
+          <a:p>
+            <a:r>
+              <a:rPr lang="fr-FR" dirty="0"/>
+              <a:t>13</a:t>
+            </a:r>
+          </a:p>
+        </p:txBody>
+      </p:sp>
+    </p:spTree>
+    <p:extLst>
+      <p:ext uri="{BB962C8B-B14F-4D97-AF65-F5344CB8AC3E}">
+        <p14:creationId xmlns:p14="http://schemas.microsoft.com/office/powerpoint/2010/main" val="4202757423"/>
+      </p:ext>
+    </p:extLst>
+  </p:cSld>
+  <p:clrMapOvr>
+    <a:masterClrMapping/>
+  </p:clrMapOvr>
+</p:sld>
+</file>
+
+<file path=ppt/slides/slide2.xml><?xml version="1.0" encoding="utf-8"?>
+<p:sld xmlns:a="http://schemas.openxmlformats.org/drawingml/2006/main" xmlns:r="http://schemas.openxmlformats.org/officeDocument/2006/relationships" xmlns:p="http://schemas.openxmlformats.org/presentationml/2006/main">
+  <p:cSld>
+    <p:spTree>
+      <p:nvGrpSpPr>
+        <p:cNvPr id="1" name=""/>
+        <p:cNvGrpSpPr/>
+        <p:nvPr/>
+      </p:nvGrpSpPr>
+      <p:grpSpPr>
+        <a:xfrm>
+          <a:off x="0" y="0"/>
+          <a:ext cx="0" cy="0"/>
+          <a:chOff x="0" y="0"/>
+          <a:chExt cx="0" cy="0"/>
+        </a:xfrm>
+      </p:grpSpPr>
+      <p:sp>
+        <p:nvSpPr>
+          <p:cNvPr id="2" name="Titre 1">
+            <a:extLst>
+              <a:ext uri="{FF2B5EF4-FFF2-40B4-BE49-F238E27FC236}">
+                <a16:creationId xmlns:a16="http://schemas.microsoft.com/office/drawing/2014/main" id="{E070BD1A-F734-004D-8050-6B841AA1C839}"/>
+              </a:ext>
+            </a:extLst>
+          </p:cNvPr>
+          <p:cNvSpPr>
+            <a:spLocks noGrp="1"/>
+          </p:cNvSpPr>
+          <p:nvPr>
+            <p:ph type="title"/>
+          </p:nvPr>
+        </p:nvSpPr>
+        <p:spPr/>
+        <p:txBody>
+          <a:bodyPr/>
+          <a:lstStyle/>
+          <a:p>
+            <a:r>
+              <a:rPr lang="fr-FR" dirty="0"/>
+              <a:t>Sommaire</a:t>
+            </a:r>
+          </a:p>
+        </p:txBody>
+      </p:sp>
+      <p:sp>
+        <p:nvSpPr>
+          <p:cNvPr id="3" name="Espace réservé du contenu 2">
+            <a:extLst>
+              <a:ext uri="{FF2B5EF4-FFF2-40B4-BE49-F238E27FC236}">
+                <a16:creationId xmlns:a16="http://schemas.microsoft.com/office/drawing/2014/main" id="{8B5A76EA-F5AA-BA48-9198-30D590CD67D9}"/>
+              </a:ext>
+            </a:extLst>
+          </p:cNvPr>
+          <p:cNvSpPr>
+            <a:spLocks noGrp="1"/>
+          </p:cNvSpPr>
+          <p:nvPr>
+            <p:ph idx="1"/>
+          </p:nvPr>
+        </p:nvSpPr>
+        <p:spPr>
+          <a:xfrm>
+            <a:off x="709630" y="4736500"/>
+            <a:ext cx="3363608" cy="1597891"/>
+          </a:xfrm>
+        </p:spPr>
+        <p:txBody>
+          <a:bodyPr>
+            <a:normAutofit/>
+          </a:bodyPr>
+          <a:lstStyle/>
+          <a:p>
+            <a:r>
+              <a:rPr lang="fr-FR" sz="1800" dirty="0"/>
+              <a:t>Gestion au début de la cave</a:t>
+            </a:r>
+          </a:p>
+          <a:p>
+            <a:r>
+              <a:rPr lang="fr-FR" sz="1800" dirty="0"/>
+              <a:t>Objectifs du projet </a:t>
+            </a:r>
+          </a:p>
+          <a:p>
+            <a:pPr lvl="1"/>
+            <a:r>
+              <a:rPr lang="fr-FR" sz="1600" dirty="0"/>
+              <a:t>Site </a:t>
+            </a:r>
+          </a:p>
+          <a:p>
+            <a:pPr lvl="1"/>
+            <a:r>
+              <a:rPr lang="fr-FR" sz="1600" dirty="0"/>
+              <a:t>Application mobile </a:t>
+            </a:r>
+          </a:p>
+        </p:txBody>
+      </p:sp>
+      <p:sp>
+        <p:nvSpPr>
+          <p:cNvPr id="4" name="Rectangle à coins arrondis 3">
+            <a:extLst>
+              <a:ext uri="{FF2B5EF4-FFF2-40B4-BE49-F238E27FC236}">
+                <a16:creationId xmlns:a16="http://schemas.microsoft.com/office/drawing/2014/main" id="{5B325F03-6E49-054A-905C-229B8AB7FA24}"/>
+              </a:ext>
+            </a:extLst>
+          </p:cNvPr>
+          <p:cNvSpPr/>
+          <p:nvPr/>
+        </p:nvSpPr>
+        <p:spPr>
+          <a:xfrm>
+            <a:off x="709630" y="2093977"/>
+            <a:ext cx="2966443" cy="2265587"/>
+          </a:xfrm>
+          <a:prstGeom prst="roundRect">
+            <a:avLst/>
+          </a:prstGeom>
+        </p:spPr>
+        <p:style>
+          <a:lnRef idx="2">
+            <a:schemeClr val="accent1">
+              <a:shade val="50000"/>
+            </a:schemeClr>
+          </a:lnRef>
+          <a:fillRef idx="1">
+            <a:schemeClr val="accent1"/>
+          </a:fillRef>
+          <a:effectRef idx="0">
+            <a:schemeClr val="accent1"/>
+          </a:effectRef>
+          <a:fontRef idx="minor">
+            <a:schemeClr val="lt1"/>
+          </a:fontRef>
+        </p:style>
+        <p:txBody>
+          <a:bodyPr rtlCol="0" anchor="ctr"/>
+          <a:lstStyle/>
+          <a:p>
+            <a:pPr algn="ctr"/>
+            <a:r>
+              <a:rPr lang="fr-FR" dirty="0"/>
+              <a:t>Introduction</a:t>
+            </a:r>
+          </a:p>
+        </p:txBody>
+      </p:sp>
+      <p:sp>
+        <p:nvSpPr>
+          <p:cNvPr id="5" name="Rectangle à coins arrondis 4">
+            <a:extLst>
+              <a:ext uri="{FF2B5EF4-FFF2-40B4-BE49-F238E27FC236}">
+                <a16:creationId xmlns:a16="http://schemas.microsoft.com/office/drawing/2014/main" id="{455A8A4E-9290-E748-98D6-FAD839D8E76B}"/>
+              </a:ext>
+            </a:extLst>
+          </p:cNvPr>
+          <p:cNvSpPr/>
+          <p:nvPr/>
+        </p:nvSpPr>
+        <p:spPr>
+          <a:xfrm>
+            <a:off x="4653557" y="2093976"/>
+            <a:ext cx="2966443" cy="2265587"/>
+          </a:xfrm>
+          <a:prstGeom prst="roundRect">
+            <a:avLst/>
+          </a:prstGeom>
+        </p:spPr>
+        <p:style>
+          <a:lnRef idx="2">
+            <a:schemeClr val="accent1">
+              <a:shade val="50000"/>
+            </a:schemeClr>
+          </a:lnRef>
+          <a:fillRef idx="1">
+            <a:schemeClr val="accent1"/>
+          </a:fillRef>
+          <a:effectRef idx="0">
+            <a:schemeClr val="accent1"/>
+          </a:effectRef>
+          <a:fontRef idx="minor">
+            <a:schemeClr val="lt1"/>
+          </a:fontRef>
+        </p:style>
+        <p:txBody>
+          <a:bodyPr rtlCol="0" anchor="ctr"/>
+          <a:lstStyle/>
+          <a:p>
+            <a:pPr algn="ctr"/>
+            <a:r>
+              <a:rPr lang="fr-FR" dirty="0"/>
+              <a:t>Développement</a:t>
+            </a:r>
+          </a:p>
+        </p:txBody>
+      </p:sp>
+      <p:sp>
+        <p:nvSpPr>
+          <p:cNvPr id="6" name="Rectangle à coins arrondis 5">
+            <a:extLst>
+              <a:ext uri="{FF2B5EF4-FFF2-40B4-BE49-F238E27FC236}">
+                <a16:creationId xmlns:a16="http://schemas.microsoft.com/office/drawing/2014/main" id="{67A4D9A3-B83A-DF4A-9E34-A0EE7F640B95}"/>
+              </a:ext>
+            </a:extLst>
+          </p:cNvPr>
+          <p:cNvSpPr/>
+          <p:nvPr/>
+        </p:nvSpPr>
+        <p:spPr>
+          <a:xfrm>
+            <a:off x="8597485" y="2093977"/>
+            <a:ext cx="2966443" cy="2265587"/>
+          </a:xfrm>
+          <a:prstGeom prst="roundRect">
+            <a:avLst/>
+          </a:prstGeom>
+        </p:spPr>
+        <p:style>
+          <a:lnRef idx="2">
+            <a:schemeClr val="accent1">
+              <a:shade val="50000"/>
+            </a:schemeClr>
+          </a:lnRef>
+          <a:fillRef idx="1">
+            <a:schemeClr val="accent1"/>
+          </a:fillRef>
+          <a:effectRef idx="0">
+            <a:schemeClr val="accent1"/>
+          </a:effectRef>
+          <a:fontRef idx="minor">
+            <a:schemeClr val="lt1"/>
+          </a:fontRef>
+        </p:style>
+        <p:txBody>
+          <a:bodyPr rtlCol="0" anchor="ctr"/>
+          <a:lstStyle/>
+          <a:p>
+            <a:pPr algn="ctr"/>
+            <a:r>
+              <a:rPr lang="fr-FR" dirty="0"/>
+              <a:t>Conclusion</a:t>
+            </a:r>
+          </a:p>
+        </p:txBody>
+      </p:sp>
+      <p:sp>
+        <p:nvSpPr>
+          <p:cNvPr id="7" name="Espace réservé du contenu 2">
+            <a:extLst>
+              <a:ext uri="{FF2B5EF4-FFF2-40B4-BE49-F238E27FC236}">
+                <a16:creationId xmlns:a16="http://schemas.microsoft.com/office/drawing/2014/main" id="{7AD48F75-DEAA-9046-9C99-D5C08F4394B3}"/>
+              </a:ext>
+            </a:extLst>
+          </p:cNvPr>
+          <p:cNvSpPr txBox="1">
+            <a:spLocks/>
+          </p:cNvSpPr>
+          <p:nvPr/>
+        </p:nvSpPr>
+        <p:spPr>
+          <a:xfrm>
+            <a:off x="4653557" y="4736500"/>
+            <a:ext cx="2966443" cy="1076057"/>
+          </a:xfrm>
+          <a:prstGeom prst="rect">
+            <a:avLst/>
+          </a:prstGeom>
+        </p:spPr>
+        <p:txBody>
+          <a:bodyPr vert="horz" lIns="91440" tIns="45720" rIns="91440" bIns="45720" rtlCol="0">
+            <a:normAutofit/>
+          </a:bodyPr>
+          <a:lstStyle>
+            <a:lvl1pPr marL="182880" indent="-182880" algn="l" defTabSz="914400" rtl="0" eaLnBrk="1" latinLnBrk="0" hangingPunct="1">
+              <a:lnSpc>
+                <a:spcPct val="90000"/>
+              </a:lnSpc>
+              <a:spcBef>
+                <a:spcPts val="1200"/>
+              </a:spcBef>
+              <a:buClr>
+                <a:schemeClr val="accent1">
+                  <a:lumMod val="75000"/>
+                </a:schemeClr>
+              </a:buClr>
+              <a:buSzPct val="85000"/>
+              <a:buFont typeface="Wingdings" pitchFamily="2" charset="2"/>
+              <a:buChar char="§"/>
+              <a:defRPr sz="2000" kern="1200">
+                <a:solidFill>
+                  <a:schemeClr val="tx1"/>
+                </a:solidFill>
+                <a:latin typeface="+mn-lt"/>
+                <a:ea typeface="+mn-ea"/>
+                <a:cs typeface="+mn-cs"/>
+              </a:defRPr>
+            </a:lvl1pPr>
+            <a:lvl2pPr marL="457200" indent="-182880" algn="l" defTabSz="914400" rtl="0" eaLnBrk="1" latinLnBrk="0" hangingPunct="1">
+              <a:lnSpc>
+                <a:spcPct val="90000"/>
+              </a:lnSpc>
+              <a:spcBef>
+                <a:spcPts val="400"/>
+              </a:spcBef>
+              <a:spcAft>
+                <a:spcPts val="200"/>
+              </a:spcAft>
+              <a:buClr>
+                <a:schemeClr val="accent1">
+                  <a:lumMod val="75000"/>
+                </a:schemeClr>
+              </a:buClr>
+              <a:buSzPct val="85000"/>
+              <a:buFont typeface="Wingdings" pitchFamily="2" charset="2"/>
+              <a:buChar char="§"/>
+              <a:defRPr sz="1800" kern="1200">
+                <a:solidFill>
+                  <a:schemeClr val="tx1"/>
+                </a:solidFill>
+                <a:latin typeface="+mn-lt"/>
+                <a:ea typeface="+mn-ea"/>
+                <a:cs typeface="+mn-cs"/>
+              </a:defRPr>
+            </a:lvl2pPr>
+            <a:lvl3pPr marL="731520" indent="-182880" algn="l" defTabSz="914400" rtl="0" eaLnBrk="1" latinLnBrk="0" hangingPunct="1">
+              <a:lnSpc>
+                <a:spcPct val="90000"/>
+              </a:lnSpc>
+              <a:spcBef>
+                <a:spcPts val="400"/>
+              </a:spcBef>
+              <a:spcAft>
+                <a:spcPts val="200"/>
+              </a:spcAft>
+              <a:buClr>
+                <a:schemeClr val="accent1">
+                  <a:lumMod val="75000"/>
+                </a:schemeClr>
+              </a:buClr>
+              <a:buSzPct val="85000"/>
+              <a:buFont typeface="Wingdings" pitchFamily="2" charset="2"/>
+              <a:buChar char="§"/>
+              <a:defRPr sz="1600" kern="1200">
+                <a:solidFill>
+                  <a:schemeClr val="tx1"/>
+                </a:solidFill>
+                <a:latin typeface="+mn-lt"/>
+                <a:ea typeface="+mn-ea"/>
+                <a:cs typeface="+mn-cs"/>
+              </a:defRPr>
+            </a:lvl3pPr>
+            <a:lvl4pPr marL="1005840" indent="-182880" algn="l" defTabSz="914400" rtl="0" eaLnBrk="1" latinLnBrk="0" hangingPunct="1">
+              <a:lnSpc>
+                <a:spcPct val="90000"/>
+              </a:lnSpc>
+              <a:spcBef>
+                <a:spcPts val="400"/>
+              </a:spcBef>
+              <a:spcAft>
+                <a:spcPts val="200"/>
+              </a:spcAft>
+              <a:buClr>
+                <a:schemeClr val="accent1">
+                  <a:lumMod val="75000"/>
+                </a:schemeClr>
+              </a:buClr>
+              <a:buSzPct val="85000"/>
+              <a:buFont typeface="Wingdings" pitchFamily="2" charset="2"/>
+              <a:buChar char="§"/>
+              <a:defRPr sz="1600" kern="1200">
+                <a:solidFill>
+                  <a:schemeClr val="tx1"/>
+                </a:solidFill>
+                <a:latin typeface="+mn-lt"/>
+                <a:ea typeface="+mn-ea"/>
+                <a:cs typeface="+mn-cs"/>
+              </a:defRPr>
+            </a:lvl4pPr>
+            <a:lvl5pPr marL="1280160" indent="-182880" algn="l" defTabSz="914400" rtl="0" eaLnBrk="1" latinLnBrk="0" hangingPunct="1">
+              <a:lnSpc>
+                <a:spcPct val="90000"/>
+              </a:lnSpc>
+              <a:spcBef>
+                <a:spcPts val="400"/>
+              </a:spcBef>
+              <a:spcAft>
+                <a:spcPts val="200"/>
+              </a:spcAft>
+              <a:buClr>
+                <a:schemeClr val="accent1">
+                  <a:lumMod val="75000"/>
+                </a:schemeClr>
+              </a:buClr>
+              <a:buSzPct val="85000"/>
+              <a:buFont typeface="Wingdings" pitchFamily="2" charset="2"/>
+              <a:buChar char="§"/>
+              <a:defRPr sz="1600" kern="1200">
+                <a:solidFill>
+                  <a:schemeClr val="tx1"/>
+                </a:solidFill>
+                <a:latin typeface="+mn-lt"/>
+                <a:ea typeface="+mn-ea"/>
+                <a:cs typeface="+mn-cs"/>
+              </a:defRPr>
+            </a:lvl5pPr>
+            <a:lvl6pPr marL="1600000" indent="-228600" algn="l" defTabSz="914400" rtl="0" eaLnBrk="1" latinLnBrk="0" hangingPunct="1">
+              <a:lnSpc>
+                <a:spcPct val="90000"/>
+              </a:lnSpc>
+              <a:spcBef>
+                <a:spcPts val="400"/>
+              </a:spcBef>
+              <a:spcAft>
+                <a:spcPts val="200"/>
+              </a:spcAft>
+              <a:buClr>
+                <a:schemeClr val="accent1">
+                  <a:lumMod val="75000"/>
+                </a:schemeClr>
+              </a:buClr>
+              <a:buSzPct val="85000"/>
+              <a:buFont typeface="Wingdings" pitchFamily="2" charset="2"/>
+              <a:buChar char="§"/>
+              <a:defRPr sz="1600" kern="1200">
+                <a:solidFill>
+                  <a:schemeClr val="tx1"/>
+                </a:solidFill>
+                <a:latin typeface="+mn-lt"/>
+                <a:ea typeface="+mn-ea"/>
+                <a:cs typeface="+mn-cs"/>
+              </a:defRPr>
+            </a:lvl6pPr>
+            <a:lvl7pPr marL="1900000" indent="-228600" algn="l" defTabSz="914400" rtl="0" eaLnBrk="1" latinLnBrk="0" hangingPunct="1">
+              <a:lnSpc>
+                <a:spcPct val="90000"/>
+              </a:lnSpc>
+              <a:spcBef>
+                <a:spcPts val="400"/>
+              </a:spcBef>
+              <a:spcAft>
+                <a:spcPts val="200"/>
+              </a:spcAft>
+              <a:buClr>
+                <a:schemeClr val="accent1">
+                  <a:lumMod val="75000"/>
+                </a:schemeClr>
+              </a:buClr>
+              <a:buSzPct val="85000"/>
+              <a:buFont typeface="Wingdings" pitchFamily="2" charset="2"/>
+              <a:buChar char="§"/>
+              <a:defRPr sz="1600" kern="1200">
+                <a:solidFill>
+                  <a:schemeClr val="tx1"/>
+                </a:solidFill>
+                <a:latin typeface="+mn-lt"/>
+                <a:ea typeface="+mn-ea"/>
+                <a:cs typeface="+mn-cs"/>
+              </a:defRPr>
+            </a:lvl7pPr>
+            <a:lvl8pPr marL="2200000" indent="-228600" algn="l" defTabSz="914400" rtl="0" eaLnBrk="1" latinLnBrk="0" hangingPunct="1">
+              <a:lnSpc>
+                <a:spcPct val="90000"/>
+              </a:lnSpc>
+              <a:spcBef>
+                <a:spcPts val="400"/>
+              </a:spcBef>
+              <a:spcAft>
+                <a:spcPts val="200"/>
+              </a:spcAft>
+              <a:buClr>
+                <a:schemeClr val="accent1">
+                  <a:lumMod val="75000"/>
+                </a:schemeClr>
+              </a:buClr>
+              <a:buSzPct val="85000"/>
+              <a:buFont typeface="Wingdings" pitchFamily="2" charset="2"/>
+              <a:buChar char="§"/>
+              <a:defRPr sz="1600" kern="1200">
+                <a:solidFill>
+                  <a:schemeClr val="tx1"/>
+                </a:solidFill>
+                <a:latin typeface="+mn-lt"/>
+                <a:ea typeface="+mn-ea"/>
+                <a:cs typeface="+mn-cs"/>
+              </a:defRPr>
+            </a:lvl8pPr>
+            <a:lvl9pPr marL="2500000" indent="-228600" algn="l" defTabSz="914400" rtl="0" eaLnBrk="1" latinLnBrk="0" hangingPunct="1">
+              <a:lnSpc>
+                <a:spcPct val="90000"/>
+              </a:lnSpc>
+              <a:spcBef>
+                <a:spcPts val="400"/>
+              </a:spcBef>
+              <a:spcAft>
+                <a:spcPts val="200"/>
+              </a:spcAft>
+              <a:buClr>
+                <a:schemeClr val="accent1">
+                  <a:lumMod val="75000"/>
+                </a:schemeClr>
+              </a:buClr>
+              <a:buSzPct val="85000"/>
+              <a:buFont typeface="Wingdings" pitchFamily="2" charset="2"/>
+              <a:buChar char="§"/>
+              <a:defRPr sz="1600" kern="1200">
+                <a:solidFill>
+                  <a:schemeClr val="tx1"/>
+                </a:solidFill>
+                <a:latin typeface="+mn-lt"/>
+                <a:ea typeface="+mn-ea"/>
+                <a:cs typeface="+mn-cs"/>
+              </a:defRPr>
+            </a:lvl9pPr>
+          </a:lstStyle>
+          <a:p>
+            <a:r>
+              <a:rPr lang="fr-FR" sz="1800" dirty="0"/>
+              <a:t>Mise en production </a:t>
+            </a:r>
+          </a:p>
+          <a:p>
+            <a:r>
+              <a:rPr lang="fr-FR" sz="1800" dirty="0"/>
+              <a:t>Application mobile </a:t>
+            </a:r>
+          </a:p>
+        </p:txBody>
+      </p:sp>
+      <p:sp>
+        <p:nvSpPr>
+          <p:cNvPr id="8" name="Espace réservé du contenu 2">
+            <a:extLst>
+              <a:ext uri="{FF2B5EF4-FFF2-40B4-BE49-F238E27FC236}">
+                <a16:creationId xmlns:a16="http://schemas.microsoft.com/office/drawing/2014/main" id="{EC1E46D1-CB9E-8E4D-9C76-1E71E531D8D1}"/>
+              </a:ext>
+            </a:extLst>
+          </p:cNvPr>
+          <p:cNvSpPr txBox="1">
+            <a:spLocks/>
+          </p:cNvSpPr>
+          <p:nvPr/>
+        </p:nvSpPr>
+        <p:spPr>
+          <a:xfrm>
+            <a:off x="8375812" y="4736500"/>
+            <a:ext cx="3280479" cy="1232407"/>
+          </a:xfrm>
+          <a:prstGeom prst="rect">
+            <a:avLst/>
+          </a:prstGeom>
+        </p:spPr>
+        <p:txBody>
+          <a:bodyPr vert="horz" lIns="91440" tIns="45720" rIns="91440" bIns="45720" rtlCol="0">
+            <a:normAutofit/>
+          </a:bodyPr>
+          <a:lstStyle>
+            <a:lvl1pPr marL="182880" indent="-182880" algn="l" defTabSz="914400" rtl="0" eaLnBrk="1" latinLnBrk="0" hangingPunct="1">
+              <a:lnSpc>
+                <a:spcPct val="90000"/>
+              </a:lnSpc>
+              <a:spcBef>
+                <a:spcPts val="1200"/>
+              </a:spcBef>
+              <a:buClr>
+                <a:schemeClr val="accent1">
+                  <a:lumMod val="75000"/>
+                </a:schemeClr>
+              </a:buClr>
+              <a:buSzPct val="85000"/>
+              <a:buFont typeface="Wingdings" pitchFamily="2" charset="2"/>
+              <a:buChar char="§"/>
+              <a:defRPr sz="2000" kern="1200">
+                <a:solidFill>
+                  <a:schemeClr val="tx1"/>
+                </a:solidFill>
+                <a:latin typeface="+mn-lt"/>
+                <a:ea typeface="+mn-ea"/>
+                <a:cs typeface="+mn-cs"/>
+              </a:defRPr>
+            </a:lvl1pPr>
+            <a:lvl2pPr marL="457200" indent="-182880" algn="l" defTabSz="914400" rtl="0" eaLnBrk="1" latinLnBrk="0" hangingPunct="1">
+              <a:lnSpc>
+                <a:spcPct val="90000"/>
+              </a:lnSpc>
+              <a:spcBef>
+                <a:spcPts val="400"/>
+              </a:spcBef>
+              <a:spcAft>
+                <a:spcPts val="200"/>
+              </a:spcAft>
+              <a:buClr>
+                <a:schemeClr val="accent1">
+                  <a:lumMod val="75000"/>
+                </a:schemeClr>
+              </a:buClr>
+              <a:buSzPct val="85000"/>
+              <a:buFont typeface="Wingdings" pitchFamily="2" charset="2"/>
+              <a:buChar char="§"/>
+              <a:defRPr sz="1800" kern="1200">
+                <a:solidFill>
+                  <a:schemeClr val="tx1"/>
+                </a:solidFill>
+                <a:latin typeface="+mn-lt"/>
+                <a:ea typeface="+mn-ea"/>
+                <a:cs typeface="+mn-cs"/>
+              </a:defRPr>
+            </a:lvl2pPr>
+            <a:lvl3pPr marL="731520" indent="-182880" algn="l" defTabSz="914400" rtl="0" eaLnBrk="1" latinLnBrk="0" hangingPunct="1">
+              <a:lnSpc>
+                <a:spcPct val="90000"/>
+              </a:lnSpc>
+              <a:spcBef>
+                <a:spcPts val="400"/>
+              </a:spcBef>
+              <a:spcAft>
+                <a:spcPts val="200"/>
+              </a:spcAft>
+              <a:buClr>
+                <a:schemeClr val="accent1">
+                  <a:lumMod val="75000"/>
+                </a:schemeClr>
+              </a:buClr>
+              <a:buSzPct val="85000"/>
+              <a:buFont typeface="Wingdings" pitchFamily="2" charset="2"/>
+              <a:buChar char="§"/>
+              <a:defRPr sz="1600" kern="1200">
+                <a:solidFill>
+                  <a:schemeClr val="tx1"/>
+                </a:solidFill>
+                <a:latin typeface="+mn-lt"/>
+                <a:ea typeface="+mn-ea"/>
+                <a:cs typeface="+mn-cs"/>
+              </a:defRPr>
+            </a:lvl3pPr>
+            <a:lvl4pPr marL="1005840" indent="-182880" algn="l" defTabSz="914400" rtl="0" eaLnBrk="1" latinLnBrk="0" hangingPunct="1">
+              <a:lnSpc>
+                <a:spcPct val="90000"/>
+              </a:lnSpc>
+              <a:spcBef>
+                <a:spcPts val="400"/>
+              </a:spcBef>
+              <a:spcAft>
+                <a:spcPts val="200"/>
+              </a:spcAft>
+              <a:buClr>
+                <a:schemeClr val="accent1">
+                  <a:lumMod val="75000"/>
+                </a:schemeClr>
+              </a:buClr>
+              <a:buSzPct val="85000"/>
+              <a:buFont typeface="Wingdings" pitchFamily="2" charset="2"/>
+              <a:buChar char="§"/>
+              <a:defRPr sz="1600" kern="1200">
+                <a:solidFill>
+                  <a:schemeClr val="tx1"/>
+                </a:solidFill>
+                <a:latin typeface="+mn-lt"/>
+                <a:ea typeface="+mn-ea"/>
+                <a:cs typeface="+mn-cs"/>
+              </a:defRPr>
+            </a:lvl4pPr>
+            <a:lvl5pPr marL="1280160" indent="-182880" algn="l" defTabSz="914400" rtl="0" eaLnBrk="1" latinLnBrk="0" hangingPunct="1">
+              <a:lnSpc>
+                <a:spcPct val="90000"/>
+              </a:lnSpc>
+              <a:spcBef>
+                <a:spcPts val="400"/>
+              </a:spcBef>
+              <a:spcAft>
+                <a:spcPts val="200"/>
+              </a:spcAft>
+              <a:buClr>
+                <a:schemeClr val="accent1">
+                  <a:lumMod val="75000"/>
+                </a:schemeClr>
+              </a:buClr>
+              <a:buSzPct val="85000"/>
+              <a:buFont typeface="Wingdings" pitchFamily="2" charset="2"/>
+              <a:buChar char="§"/>
+              <a:defRPr sz="1600" kern="1200">
+                <a:solidFill>
+                  <a:schemeClr val="tx1"/>
+                </a:solidFill>
+                <a:latin typeface="+mn-lt"/>
+                <a:ea typeface="+mn-ea"/>
+                <a:cs typeface="+mn-cs"/>
+              </a:defRPr>
+            </a:lvl5pPr>
+            <a:lvl6pPr marL="1600000" indent="-228600" algn="l" defTabSz="914400" rtl="0" eaLnBrk="1" latinLnBrk="0" hangingPunct="1">
+              <a:lnSpc>
+                <a:spcPct val="90000"/>
+              </a:lnSpc>
+              <a:spcBef>
+                <a:spcPts val="400"/>
+              </a:spcBef>
+              <a:spcAft>
+                <a:spcPts val="200"/>
+              </a:spcAft>
+              <a:buClr>
+                <a:schemeClr val="accent1">
+                  <a:lumMod val="75000"/>
+                </a:schemeClr>
+              </a:buClr>
+              <a:buSzPct val="85000"/>
+              <a:buFont typeface="Wingdings" pitchFamily="2" charset="2"/>
+              <a:buChar char="§"/>
+              <a:defRPr sz="1600" kern="1200">
+                <a:solidFill>
+                  <a:schemeClr val="tx1"/>
+                </a:solidFill>
+                <a:latin typeface="+mn-lt"/>
+                <a:ea typeface="+mn-ea"/>
+                <a:cs typeface="+mn-cs"/>
+              </a:defRPr>
+            </a:lvl6pPr>
+            <a:lvl7pPr marL="1900000" indent="-228600" algn="l" defTabSz="914400" rtl="0" eaLnBrk="1" latinLnBrk="0" hangingPunct="1">
+              <a:lnSpc>
+                <a:spcPct val="90000"/>
+              </a:lnSpc>
+              <a:spcBef>
+                <a:spcPts val="400"/>
+              </a:spcBef>
+              <a:spcAft>
+                <a:spcPts val="200"/>
+              </a:spcAft>
+              <a:buClr>
+                <a:schemeClr val="accent1">
+                  <a:lumMod val="75000"/>
+                </a:schemeClr>
+              </a:buClr>
+              <a:buSzPct val="85000"/>
+              <a:buFont typeface="Wingdings" pitchFamily="2" charset="2"/>
+              <a:buChar char="§"/>
+              <a:defRPr sz="1600" kern="1200">
+                <a:solidFill>
+                  <a:schemeClr val="tx1"/>
+                </a:solidFill>
+                <a:latin typeface="+mn-lt"/>
+                <a:ea typeface="+mn-ea"/>
+                <a:cs typeface="+mn-cs"/>
+              </a:defRPr>
+            </a:lvl7pPr>
+            <a:lvl8pPr marL="2200000" indent="-228600" algn="l" defTabSz="914400" rtl="0" eaLnBrk="1" latinLnBrk="0" hangingPunct="1">
+              <a:lnSpc>
+                <a:spcPct val="90000"/>
+              </a:lnSpc>
+              <a:spcBef>
+                <a:spcPts val="400"/>
+              </a:spcBef>
+              <a:spcAft>
+                <a:spcPts val="200"/>
+              </a:spcAft>
+              <a:buClr>
+                <a:schemeClr val="accent1">
+                  <a:lumMod val="75000"/>
+                </a:schemeClr>
+              </a:buClr>
+              <a:buSzPct val="85000"/>
+              <a:buFont typeface="Wingdings" pitchFamily="2" charset="2"/>
+              <a:buChar char="§"/>
+              <a:defRPr sz="1600" kern="1200">
+                <a:solidFill>
+                  <a:schemeClr val="tx1"/>
+                </a:solidFill>
+                <a:latin typeface="+mn-lt"/>
+                <a:ea typeface="+mn-ea"/>
+                <a:cs typeface="+mn-cs"/>
+              </a:defRPr>
+            </a:lvl8pPr>
+            <a:lvl9pPr marL="2500000" indent="-228600" algn="l" defTabSz="914400" rtl="0" eaLnBrk="1" latinLnBrk="0" hangingPunct="1">
+              <a:lnSpc>
+                <a:spcPct val="90000"/>
+              </a:lnSpc>
+              <a:spcBef>
+                <a:spcPts val="400"/>
+              </a:spcBef>
+              <a:spcAft>
+                <a:spcPts val="200"/>
+              </a:spcAft>
+              <a:buClr>
+                <a:schemeClr val="accent1">
+                  <a:lumMod val="75000"/>
+                </a:schemeClr>
+              </a:buClr>
+              <a:buSzPct val="85000"/>
+              <a:buFont typeface="Wingdings" pitchFamily="2" charset="2"/>
+              <a:buChar char="§"/>
+              <a:defRPr sz="1600" kern="1200">
+                <a:solidFill>
+                  <a:schemeClr val="tx1"/>
+                </a:solidFill>
+                <a:latin typeface="+mn-lt"/>
+                <a:ea typeface="+mn-ea"/>
+                <a:cs typeface="+mn-cs"/>
+              </a:defRPr>
+            </a:lvl9pPr>
+          </a:lstStyle>
+          <a:p>
+            <a:r>
+              <a:rPr lang="fr-FR" sz="1800" dirty="0"/>
+              <a:t>Difficultés rencontrés </a:t>
+            </a:r>
+          </a:p>
+          <a:p>
+            <a:r>
+              <a:rPr lang="fr-FR" sz="1800" dirty="0"/>
+              <a:t>Améliorations</a:t>
+            </a:r>
+          </a:p>
+          <a:p>
+            <a:r>
+              <a:rPr lang="fr-FR" sz="1800" dirty="0"/>
+              <a:t>Points positifs</a:t>
+            </a:r>
+          </a:p>
+        </p:txBody>
+      </p:sp>
+    </p:spTree>
+    <p:extLst>
+      <p:ext uri="{BB962C8B-B14F-4D97-AF65-F5344CB8AC3E}">
+        <p14:creationId xmlns:p14="http://schemas.microsoft.com/office/powerpoint/2010/main" val="3285485381"/>
+      </p:ext>
+    </p:extLst>
+  </p:cSld>
+  <p:clrMapOvr>
+    <a:masterClrMapping/>
+  </p:clrMapOvr>
+</p:sld>
+</file>
+
+<file path=ppt/slides/slide20.xml><?xml version="1.0" encoding="utf-8"?>
+<p:sld xmlns:a="http://schemas.openxmlformats.org/drawingml/2006/main" xmlns:r="http://schemas.openxmlformats.org/officeDocument/2006/relationships" xmlns:p="http://schemas.openxmlformats.org/presentationml/2006/main">
+  <p:cSld>
+    <p:spTree>
+      <p:nvGrpSpPr>
+        <p:cNvPr id="1" name=""/>
+        <p:cNvGrpSpPr/>
+        <p:nvPr/>
+      </p:nvGrpSpPr>
+      <p:grpSpPr>
+        <a:xfrm>
+          <a:off x="0" y="0"/>
+          <a:ext cx="0" cy="0"/>
+          <a:chOff x="0" y="0"/>
+          <a:chExt cx="0" cy="0"/>
+        </a:xfrm>
+      </p:grpSpPr>
+      <p:sp>
+        <p:nvSpPr>
+          <p:cNvPr id="2" name="Titre 1">
+            <a:extLst>
+              <a:ext uri="{FF2B5EF4-FFF2-40B4-BE49-F238E27FC236}">
+                <a16:creationId xmlns:a16="http://schemas.microsoft.com/office/drawing/2014/main" id="{75E1B9BB-D0F5-8740-88DE-6961715A23F3}"/>
+              </a:ext>
+            </a:extLst>
+          </p:cNvPr>
+          <p:cNvSpPr>
+            <a:spLocks noGrp="1"/>
+          </p:cNvSpPr>
+          <p:nvPr>
+            <p:ph type="title"/>
+          </p:nvPr>
+        </p:nvSpPr>
+        <p:spPr/>
+        <p:txBody>
+          <a:bodyPr/>
+          <a:lstStyle/>
+          <a:p>
+            <a:r>
+              <a:rPr lang="fr-FR" dirty="0"/>
+              <a:t>Questions ?</a:t>
+            </a:r>
+          </a:p>
+        </p:txBody>
+      </p:sp>
+      <p:sp>
+        <p:nvSpPr>
+          <p:cNvPr id="3" name="Espace réservé du contenu 2">
+            <a:extLst>
+              <a:ext uri="{FF2B5EF4-FFF2-40B4-BE49-F238E27FC236}">
+                <a16:creationId xmlns:a16="http://schemas.microsoft.com/office/drawing/2014/main" id="{6C57822B-04F7-EA40-8AA1-E9842AE8BBAA}"/>
+              </a:ext>
+            </a:extLst>
+          </p:cNvPr>
+          <p:cNvSpPr>
+            <a:spLocks noGrp="1"/>
+          </p:cNvSpPr>
+          <p:nvPr>
+            <p:ph idx="1"/>
+          </p:nvPr>
+        </p:nvSpPr>
+        <p:spPr/>
+        <p:txBody>
+          <a:bodyPr/>
+          <a:lstStyle/>
+          <a:p>
+            <a:endParaRPr lang="fr-FR"/>
+          </a:p>
+        </p:txBody>
+      </p:sp>
+      <p:sp>
+        <p:nvSpPr>
+          <p:cNvPr id="4" name="ZoneTexte 3">
+            <a:extLst>
+              <a:ext uri="{FF2B5EF4-FFF2-40B4-BE49-F238E27FC236}">
+                <a16:creationId xmlns:a16="http://schemas.microsoft.com/office/drawing/2014/main" id="{5F8F30CE-4293-2041-B7A3-B6539329FCAB}"/>
+              </a:ext>
+            </a:extLst>
+          </p:cNvPr>
+          <p:cNvSpPr txBox="1"/>
+          <p:nvPr/>
+        </p:nvSpPr>
+        <p:spPr>
+          <a:xfrm>
+            <a:off x="11406908" y="6297888"/>
+            <a:ext cx="457176" cy="369332"/>
+          </a:xfrm>
+          <a:prstGeom prst="rect">
+            <a:avLst/>
+          </a:prstGeom>
+          <a:noFill/>
+        </p:spPr>
+        <p:txBody>
+          <a:bodyPr wrap="none" rtlCol="0">
+            <a:spAutoFit/>
+          </a:bodyPr>
+          <a:lstStyle/>
+          <a:p>
+            <a:r>
+              <a:rPr lang="fr-FR" dirty="0"/>
+              <a:t>14</a:t>
+            </a:r>
+          </a:p>
+        </p:txBody>
+      </p:sp>
+    </p:spTree>
+    <p:extLst>
+      <p:ext uri="{BB962C8B-B14F-4D97-AF65-F5344CB8AC3E}">
+        <p14:creationId xmlns:p14="http://schemas.microsoft.com/office/powerpoint/2010/main" val="152265451"/>
+      </p:ext>
+    </p:extLst>
+  </p:cSld>
+  <p:clrMapOvr>
+    <a:masterClrMapping/>
+  </p:clrMapOvr>
+</p:sld>
+</file>
+
+<file path=ppt/slides/slide3.xml><?xml version="1.0" encoding="utf-8"?>
+<p:sld xmlns:a="http://schemas.openxmlformats.org/drawingml/2006/main" xmlns:r="http://schemas.openxmlformats.org/officeDocument/2006/relationships" xmlns:p="http://schemas.openxmlformats.org/presentationml/2006/main">
+  <p:cSld>
+    <p:spTree>
+      <p:nvGrpSpPr>
+        <p:cNvPr id="1" name=""/>
+        <p:cNvGrpSpPr/>
+        <p:nvPr/>
+      </p:nvGrpSpPr>
+      <p:grpSpPr>
+        <a:xfrm>
+          <a:off x="0" y="0"/>
+          <a:ext cx="0" cy="0"/>
+          <a:chOff x="0" y="0"/>
+          <a:chExt cx="0" cy="0"/>
+        </a:xfrm>
+      </p:grpSpPr>
+      <p:sp>
+        <p:nvSpPr>
+          <p:cNvPr id="2" name="Titre 1">
+            <a:extLst>
+              <a:ext uri="{FF2B5EF4-FFF2-40B4-BE49-F238E27FC236}">
+                <a16:creationId xmlns:a16="http://schemas.microsoft.com/office/drawing/2014/main" id="{E070BD1A-F734-004D-8050-6B841AA1C839}"/>
+              </a:ext>
+            </a:extLst>
+          </p:cNvPr>
+          <p:cNvSpPr>
+            <a:spLocks noGrp="1"/>
+          </p:cNvSpPr>
+          <p:nvPr>
+            <p:ph type="title"/>
+          </p:nvPr>
+        </p:nvSpPr>
+        <p:spPr/>
+        <p:txBody>
+          <a:bodyPr/>
+          <a:lstStyle/>
+          <a:p>
+            <a:r>
+              <a:rPr lang="fr-FR" dirty="0"/>
+              <a:t>Déroulement</a:t>
+            </a:r>
+          </a:p>
+        </p:txBody>
+      </p:sp>
+      <p:sp>
+        <p:nvSpPr>
+          <p:cNvPr id="4" name="Rectangle à coins arrondis 3">
+            <a:extLst>
+              <a:ext uri="{FF2B5EF4-FFF2-40B4-BE49-F238E27FC236}">
+                <a16:creationId xmlns:a16="http://schemas.microsoft.com/office/drawing/2014/main" id="{5B325F03-6E49-054A-905C-229B8AB7FA24}"/>
+              </a:ext>
+            </a:extLst>
+          </p:cNvPr>
+          <p:cNvSpPr/>
+          <p:nvPr/>
+        </p:nvSpPr>
+        <p:spPr>
+          <a:xfrm>
+            <a:off x="663448" y="2675868"/>
+            <a:ext cx="2966443" cy="2265587"/>
+          </a:xfrm>
+          <a:prstGeom prst="roundRect">
+            <a:avLst/>
+          </a:prstGeom>
+        </p:spPr>
+        <p:style>
+          <a:lnRef idx="2">
+            <a:schemeClr val="accent1">
+              <a:shade val="50000"/>
+            </a:schemeClr>
+          </a:lnRef>
+          <a:fillRef idx="1">
+            <a:schemeClr val="accent1"/>
+          </a:fillRef>
+          <a:effectRef idx="0">
+            <a:schemeClr val="accent1"/>
+          </a:effectRef>
+          <a:fontRef idx="minor">
+            <a:schemeClr val="lt1"/>
+          </a:fontRef>
+        </p:style>
+        <p:txBody>
+          <a:bodyPr rtlCol="0" anchor="ctr"/>
+          <a:lstStyle/>
+          <a:p>
+            <a:pPr algn="ctr"/>
+            <a:r>
+              <a:rPr lang="fr-FR" dirty="0"/>
+              <a:t>Introduction</a:t>
+            </a:r>
+          </a:p>
+        </p:txBody>
+      </p:sp>
+      <p:sp>
+        <p:nvSpPr>
+          <p:cNvPr id="5" name="Rectangle à coins arrondis 4">
+            <a:extLst>
+              <a:ext uri="{FF2B5EF4-FFF2-40B4-BE49-F238E27FC236}">
+                <a16:creationId xmlns:a16="http://schemas.microsoft.com/office/drawing/2014/main" id="{455A8A4E-9290-E748-98D6-FAD839D8E76B}"/>
+              </a:ext>
+            </a:extLst>
+          </p:cNvPr>
+          <p:cNvSpPr/>
+          <p:nvPr/>
+        </p:nvSpPr>
+        <p:spPr>
+          <a:xfrm>
+            <a:off x="4607375" y="2675867"/>
+            <a:ext cx="2966443" cy="2265587"/>
+          </a:xfrm>
+          <a:prstGeom prst="roundRect">
+            <a:avLst/>
+          </a:prstGeom>
+        </p:spPr>
+        <p:style>
+          <a:lnRef idx="2">
+            <a:schemeClr val="dk1">
+              <a:shade val="50000"/>
+            </a:schemeClr>
+          </a:lnRef>
+          <a:fillRef idx="1">
+            <a:schemeClr val="dk1"/>
+          </a:fillRef>
+          <a:effectRef idx="0">
+            <a:schemeClr val="dk1"/>
+          </a:effectRef>
+          <a:fontRef idx="minor">
+            <a:schemeClr val="lt1"/>
+          </a:fontRef>
+        </p:style>
+        <p:txBody>
+          <a:bodyPr rtlCol="0" anchor="ctr"/>
+          <a:lstStyle/>
+          <a:p>
+            <a:pPr algn="ctr"/>
+            <a:r>
+              <a:rPr lang="fr-FR" dirty="0"/>
+              <a:t>Développement</a:t>
+            </a:r>
+          </a:p>
+        </p:txBody>
+      </p:sp>
+      <p:sp>
+        <p:nvSpPr>
+          <p:cNvPr id="6" name="Rectangle à coins arrondis 5">
+            <a:extLst>
+              <a:ext uri="{FF2B5EF4-FFF2-40B4-BE49-F238E27FC236}">
+                <a16:creationId xmlns:a16="http://schemas.microsoft.com/office/drawing/2014/main" id="{67A4D9A3-B83A-DF4A-9E34-A0EE7F640B95}"/>
+              </a:ext>
+            </a:extLst>
+          </p:cNvPr>
+          <p:cNvSpPr/>
+          <p:nvPr/>
+        </p:nvSpPr>
+        <p:spPr>
+          <a:xfrm>
+            <a:off x="8551303" y="2675868"/>
+            <a:ext cx="2966443" cy="2265587"/>
+          </a:xfrm>
+          <a:prstGeom prst="roundRect">
+            <a:avLst/>
+          </a:prstGeom>
+        </p:spPr>
+        <p:style>
+          <a:lnRef idx="2">
+            <a:schemeClr val="dk1">
+              <a:shade val="50000"/>
+            </a:schemeClr>
+          </a:lnRef>
+          <a:fillRef idx="1">
+            <a:schemeClr val="dk1"/>
+          </a:fillRef>
+          <a:effectRef idx="0">
+            <a:schemeClr val="dk1"/>
+          </a:effectRef>
+          <a:fontRef idx="minor">
+            <a:schemeClr val="lt1"/>
+          </a:fontRef>
+        </p:style>
+        <p:txBody>
+          <a:bodyPr rtlCol="0" anchor="ctr"/>
+          <a:lstStyle/>
+          <a:p>
+            <a:pPr algn="ctr"/>
+            <a:r>
+              <a:rPr lang="fr-FR" dirty="0"/>
+              <a:t>Conclusion</a:t>
+            </a:r>
+          </a:p>
+        </p:txBody>
+      </p:sp>
+    </p:spTree>
+    <p:extLst>
+      <p:ext uri="{BB962C8B-B14F-4D97-AF65-F5344CB8AC3E}">
+        <p14:creationId xmlns:p14="http://schemas.microsoft.com/office/powerpoint/2010/main" val="2508586254"/>
+      </p:ext>
+    </p:extLst>
+  </p:cSld>
+  <p:clrMapOvr>
+    <a:masterClrMapping/>
+  </p:clrMapOvr>
+</p:sld>
+</file>
+
+<file path=ppt/slides/slide4.xml><?xml version="1.0" encoding="utf-8"?>
+<p:sld xmlns:a="http://schemas.openxmlformats.org/drawingml/2006/main" xmlns:r="http://schemas.openxmlformats.org/officeDocument/2006/relationships" xmlns:p="http://schemas.openxmlformats.org/presentationml/2006/main">
+  <p:cSld>
+    <p:spTree>
+      <p:nvGrpSpPr>
+        <p:cNvPr id="1" name=""/>
+        <p:cNvGrpSpPr/>
+        <p:nvPr/>
+      </p:nvGrpSpPr>
+      <p:grpSpPr>
+        <a:xfrm>
+          <a:off x="0" y="0"/>
+          <a:ext cx="0" cy="0"/>
+          <a:chOff x="0" y="0"/>
+          <a:chExt cx="0" cy="0"/>
+        </a:xfrm>
+      </p:grpSpPr>
+      <p:sp>
+        <p:nvSpPr>
+          <p:cNvPr id="2" name="Titre 1">
+            <a:extLst>
+              <a:ext uri="{FF2B5EF4-FFF2-40B4-BE49-F238E27FC236}">
+                <a16:creationId xmlns:a16="http://schemas.microsoft.com/office/drawing/2014/main" id="{152591FC-1002-5842-83F0-7D8B0E5A9D14}"/>
+              </a:ext>
+            </a:extLst>
+          </p:cNvPr>
+          <p:cNvSpPr>
+            <a:spLocks noGrp="1"/>
+          </p:cNvSpPr>
+          <p:nvPr>
+            <p:ph type="title"/>
+          </p:nvPr>
+        </p:nvSpPr>
+        <p:spPr/>
+        <p:txBody>
+          <a:bodyPr/>
+          <a:lstStyle/>
+          <a:p>
+            <a:r>
+              <a:rPr lang="fr-FR" dirty="0"/>
+              <a:t>Introduction</a:t>
+            </a:r>
+          </a:p>
+        </p:txBody>
+      </p:sp>
+      <p:sp>
+        <p:nvSpPr>
+          <p:cNvPr id="3" name="Espace réservé du contenu 2">
+            <a:extLst>
+              <a:ext uri="{FF2B5EF4-FFF2-40B4-BE49-F238E27FC236}">
+                <a16:creationId xmlns:a16="http://schemas.microsoft.com/office/drawing/2014/main" id="{1939E1C6-9CE1-3649-902D-F9F092FC4373}"/>
+              </a:ext>
+            </a:extLst>
+          </p:cNvPr>
+          <p:cNvSpPr>
+            <a:spLocks noGrp="1"/>
+          </p:cNvSpPr>
+          <p:nvPr>
+            <p:ph idx="1"/>
+          </p:nvPr>
+        </p:nvSpPr>
+        <p:spPr/>
+        <p:txBody>
+          <a:bodyPr/>
+          <a:lstStyle/>
+          <a:p>
+            <a:r>
+              <a:rPr lang="fr-FR" dirty="0"/>
+              <a:t>1 client, M. Louis Pache</a:t>
+            </a:r>
+          </a:p>
+          <a:p>
+            <a:r>
+              <a:rPr lang="fr-FR" dirty="0"/>
+              <a:t>Cercle d’Yverdon </a:t>
+            </a:r>
+          </a:p>
+          <a:p>
+            <a:r>
+              <a:rPr lang="fr-FR" dirty="0"/>
+              <a:t>Gestion de cave </a:t>
+            </a:r>
+          </a:p>
+          <a:p>
+            <a:r>
+              <a:rPr lang="fr-FR" dirty="0"/>
+              <a:t>Aide au CPNV</a:t>
+            </a:r>
+          </a:p>
+          <a:p>
+            <a:r>
+              <a:rPr lang="fr-FR" dirty="0"/>
+              <a:t>Application mobile et site web </a:t>
+            </a:r>
+          </a:p>
+          <a:p>
+            <a:r>
+              <a:rPr lang="fr-FR" dirty="0"/>
+              <a:t>Pré-TPI, site + application mobile</a:t>
+            </a:r>
+          </a:p>
+          <a:p>
+            <a:r>
+              <a:rPr lang="fr-FR" dirty="0"/>
+              <a:t>Tâche de faire ce projet</a:t>
+            </a:r>
+          </a:p>
+        </p:txBody>
+      </p:sp>
+      <p:sp>
+        <p:nvSpPr>
+          <p:cNvPr id="4" name="ZoneTexte 3">
+            <a:extLst>
+              <a:ext uri="{FF2B5EF4-FFF2-40B4-BE49-F238E27FC236}">
+                <a16:creationId xmlns:a16="http://schemas.microsoft.com/office/drawing/2014/main" id="{CE59A308-95E8-B34E-BC94-40485EE01DB6}"/>
+              </a:ext>
+            </a:extLst>
+          </p:cNvPr>
+          <p:cNvSpPr txBox="1"/>
+          <p:nvPr/>
+        </p:nvSpPr>
+        <p:spPr>
+          <a:xfrm>
+            <a:off x="11480799" y="6289963"/>
+            <a:ext cx="320922" cy="369332"/>
+          </a:xfrm>
+          <a:prstGeom prst="rect">
+            <a:avLst/>
+          </a:prstGeom>
+          <a:noFill/>
+        </p:spPr>
+        <p:txBody>
+          <a:bodyPr wrap="none" rtlCol="0">
+            <a:spAutoFit/>
+          </a:bodyPr>
+          <a:lstStyle/>
+          <a:p>
+            <a:r>
+              <a:rPr lang="fr-FR" dirty="0"/>
+              <a:t>2</a:t>
+            </a:r>
+          </a:p>
+        </p:txBody>
+      </p:sp>
+    </p:spTree>
+    <p:extLst>
+      <p:ext uri="{BB962C8B-B14F-4D97-AF65-F5344CB8AC3E}">
+        <p14:creationId xmlns:p14="http://schemas.microsoft.com/office/powerpoint/2010/main" val="1662323745"/>
+      </p:ext>
+    </p:extLst>
+  </p:cSld>
+  <p:clrMapOvr>
+    <a:masterClrMapping/>
+  </p:clrMapOvr>
+</p:sld>
+</file>
+
+<file path=ppt/slides/slide5.xml><?xml version="1.0" encoding="utf-8"?>
+<p:sld xmlns:a="http://schemas.openxmlformats.org/drawingml/2006/main" xmlns:r="http://schemas.openxmlformats.org/officeDocument/2006/relationships" xmlns:p="http://schemas.openxmlformats.org/presentationml/2006/main">
+  <p:cSld>
+    <p:spTree>
+      <p:nvGrpSpPr>
+        <p:cNvPr id="1" name=""/>
+        <p:cNvGrpSpPr/>
+        <p:nvPr/>
+      </p:nvGrpSpPr>
+      <p:grpSpPr>
+        <a:xfrm>
+          <a:off x="0" y="0"/>
+          <a:ext cx="0" cy="0"/>
+          <a:chOff x="0" y="0"/>
+          <a:chExt cx="0" cy="0"/>
+        </a:xfrm>
+      </p:grpSpPr>
+      <p:sp>
+        <p:nvSpPr>
+          <p:cNvPr id="2" name="Titre 1">
+            <a:extLst>
+              <a:ext uri="{FF2B5EF4-FFF2-40B4-BE49-F238E27FC236}">
+                <a16:creationId xmlns:a16="http://schemas.microsoft.com/office/drawing/2014/main" id="{ACD7763A-0C4E-AB40-BF95-242E25A615D2}"/>
+              </a:ext>
+            </a:extLst>
+          </p:cNvPr>
+          <p:cNvSpPr>
+            <a:spLocks noGrp="1"/>
+          </p:cNvSpPr>
+          <p:nvPr>
+            <p:ph type="title"/>
+          </p:nvPr>
+        </p:nvSpPr>
+        <p:spPr/>
+        <p:txBody>
+          <a:bodyPr/>
+          <a:lstStyle/>
+          <a:p>
+            <a:r>
+              <a:rPr lang="fr-FR" dirty="0"/>
+              <a:t>Gestion de la cave</a:t>
+            </a:r>
+          </a:p>
+        </p:txBody>
+      </p:sp>
+      <p:pic>
+        <p:nvPicPr>
+          <p:cNvPr id="5" name="Espace réservé du contenu 4">
+            <a:extLst>
+              <a:ext uri="{FF2B5EF4-FFF2-40B4-BE49-F238E27FC236}">
+                <a16:creationId xmlns:a16="http://schemas.microsoft.com/office/drawing/2014/main" id="{B229CE2C-2A87-1441-9757-97E10BD393B4}"/>
+              </a:ext>
+            </a:extLst>
+          </p:cNvPr>
+          <p:cNvPicPr>
+            <a:picLocks noGrp="1" noChangeAspect="1"/>
+          </p:cNvPicPr>
+          <p:nvPr>
+            <p:ph idx="1"/>
+          </p:nvPr>
+        </p:nvPicPr>
+        <p:blipFill rotWithShape="1">
+          <a:blip r:embed="rId2"/>
+          <a:srcRect l="5176" t="7554" r="9915" b="5755"/>
+          <a:stretch/>
+        </p:blipFill>
+        <p:spPr>
+          <a:xfrm rot="5400000">
+            <a:off x="5827392" y="804317"/>
+            <a:ext cx="6866434" cy="5257800"/>
+          </a:xfrm>
+        </p:spPr>
+      </p:pic>
+      <p:sp>
+        <p:nvSpPr>
+          <p:cNvPr id="6" name="ZoneTexte 5">
+            <a:extLst>
+              <a:ext uri="{FF2B5EF4-FFF2-40B4-BE49-F238E27FC236}">
+                <a16:creationId xmlns:a16="http://schemas.microsoft.com/office/drawing/2014/main" id="{FEF48E5C-53E8-7348-8E84-854C2A70E082}"/>
+              </a:ext>
+            </a:extLst>
+          </p:cNvPr>
+          <p:cNvSpPr txBox="1"/>
+          <p:nvPr/>
+        </p:nvSpPr>
+        <p:spPr>
+          <a:xfrm>
+            <a:off x="1069848" y="2909997"/>
+            <a:ext cx="4102516" cy="523220"/>
+          </a:xfrm>
+          <a:prstGeom prst="rect">
+            <a:avLst/>
+          </a:prstGeom>
+          <a:noFill/>
+        </p:spPr>
+        <p:txBody>
+          <a:bodyPr wrap="square" rtlCol="0">
+            <a:spAutoFit/>
+          </a:bodyPr>
+          <a:lstStyle/>
+          <a:p>
+            <a:pPr marL="457200" indent="-457200">
+              <a:buFont typeface="Arial" panose="020B0604020202020204" pitchFamily="34" charset="0"/>
+              <a:buChar char="•"/>
+            </a:pPr>
+            <a:r>
+              <a:rPr lang="fr-FR" sz="2800" dirty="0"/>
+              <a:t>Ancienne méthode</a:t>
+            </a:r>
+          </a:p>
+        </p:txBody>
+      </p:sp>
+    </p:spTree>
+    <p:extLst>
+      <p:ext uri="{BB962C8B-B14F-4D97-AF65-F5344CB8AC3E}">
+        <p14:creationId xmlns:p14="http://schemas.microsoft.com/office/powerpoint/2010/main" val="3437800917"/>
+      </p:ext>
+    </p:extLst>
+  </p:cSld>
+  <p:clrMapOvr>
+    <a:masterClrMapping/>
+  </p:clrMapOvr>
+</p:sld>
+</file>
+
+<file path=ppt/slides/slide6.xml><?xml version="1.0" encoding="utf-8"?>
+<p:sld xmlns:a="http://schemas.openxmlformats.org/drawingml/2006/main" xmlns:r="http://schemas.openxmlformats.org/officeDocument/2006/relationships" xmlns:p="http://schemas.openxmlformats.org/presentationml/2006/main">
+  <p:cSld>
+    <p:spTree>
+      <p:nvGrpSpPr>
+        <p:cNvPr id="1" name=""/>
+        <p:cNvGrpSpPr/>
+        <p:nvPr/>
+      </p:nvGrpSpPr>
+      <p:grpSpPr>
+        <a:xfrm>
+          <a:off x="0" y="0"/>
+          <a:ext cx="0" cy="0"/>
+          <a:chOff x="0" y="0"/>
+          <a:chExt cx="0" cy="0"/>
+        </a:xfrm>
+      </p:grpSpPr>
+      <p:sp>
+        <p:nvSpPr>
+          <p:cNvPr id="2" name="Titre 1">
+            <a:extLst>
+              <a:ext uri="{FF2B5EF4-FFF2-40B4-BE49-F238E27FC236}">
+                <a16:creationId xmlns:a16="http://schemas.microsoft.com/office/drawing/2014/main" id="{83A9A594-5570-0649-BEB6-057C8F707B05}"/>
+              </a:ext>
+            </a:extLst>
+          </p:cNvPr>
+          <p:cNvSpPr>
+            <a:spLocks noGrp="1"/>
+          </p:cNvSpPr>
+          <p:nvPr>
+            <p:ph type="title"/>
+          </p:nvPr>
+        </p:nvSpPr>
+        <p:spPr/>
+        <p:txBody>
+          <a:bodyPr/>
+          <a:lstStyle/>
+          <a:p>
+            <a:r>
+              <a:rPr lang="fr-FR" dirty="0"/>
+              <a:t>Objectifs du site</a:t>
+            </a:r>
+          </a:p>
+        </p:txBody>
+      </p:sp>
+      <p:sp>
+        <p:nvSpPr>
+          <p:cNvPr id="3" name="Espace réservé du contenu 2">
+            <a:extLst>
+              <a:ext uri="{FF2B5EF4-FFF2-40B4-BE49-F238E27FC236}">
+                <a16:creationId xmlns:a16="http://schemas.microsoft.com/office/drawing/2014/main" id="{3E94145A-5012-FF43-9A80-63FDD4B7BEAE}"/>
+              </a:ext>
+            </a:extLst>
+          </p:cNvPr>
+          <p:cNvSpPr>
+            <a:spLocks noGrp="1"/>
+          </p:cNvSpPr>
+          <p:nvPr>
+            <p:ph idx="1"/>
+          </p:nvPr>
+        </p:nvSpPr>
+        <p:spPr/>
+        <p:txBody>
+          <a:bodyPr/>
+          <a:lstStyle/>
+          <a:p>
+            <a:r>
+              <a:rPr lang="fr-FR" dirty="0"/>
+              <a:t>Introduire un nouveau vin</a:t>
+            </a:r>
+          </a:p>
+          <a:p>
+            <a:r>
+              <a:rPr lang="fr-FR" dirty="0"/>
+              <a:t>Ajouter ou retirer un vin </a:t>
+            </a:r>
+          </a:p>
+          <a:p>
+            <a:r>
+              <a:rPr lang="fr-FR" dirty="0"/>
+              <a:t>Créer et imprimer des QR Code</a:t>
+            </a:r>
+          </a:p>
+          <a:p>
+            <a:r>
+              <a:rPr lang="fr-FR" dirty="0"/>
+              <a:t>Consulter le stock actuel</a:t>
+            </a:r>
+          </a:p>
+          <a:p>
+            <a:pPr lvl="1"/>
+            <a:r>
+              <a:rPr lang="fr-FR" dirty="0"/>
+              <a:t>À une date donnée</a:t>
+            </a:r>
+          </a:p>
+        </p:txBody>
+      </p:sp>
+    </p:spTree>
+    <p:extLst>
+      <p:ext uri="{BB962C8B-B14F-4D97-AF65-F5344CB8AC3E}">
+        <p14:creationId xmlns:p14="http://schemas.microsoft.com/office/powerpoint/2010/main" val="642289248"/>
+      </p:ext>
+    </p:extLst>
+  </p:cSld>
+  <p:clrMapOvr>
+    <a:masterClrMapping/>
+  </p:clrMapOvr>
+</p:sld>
+</file>
+
+<file path=ppt/slides/slide7.xml><?xml version="1.0" encoding="utf-8"?>
+<p:sld xmlns:a="http://schemas.openxmlformats.org/drawingml/2006/main" xmlns:r="http://schemas.openxmlformats.org/officeDocument/2006/relationships" xmlns:p="http://schemas.openxmlformats.org/presentationml/2006/main">
+  <p:cSld>
+    <p:spTree>
+      <p:nvGrpSpPr>
+        <p:cNvPr id="1" name=""/>
+        <p:cNvGrpSpPr/>
+        <p:nvPr/>
+      </p:nvGrpSpPr>
+      <p:grpSpPr>
+        <a:xfrm>
+          <a:off x="0" y="0"/>
+          <a:ext cx="0" cy="0"/>
+          <a:chOff x="0" y="0"/>
+          <a:chExt cx="0" cy="0"/>
+        </a:xfrm>
+      </p:grpSpPr>
+      <p:sp>
+        <p:nvSpPr>
+          <p:cNvPr id="2" name="Titre 1">
+            <a:extLst>
+              <a:ext uri="{FF2B5EF4-FFF2-40B4-BE49-F238E27FC236}">
+                <a16:creationId xmlns:a16="http://schemas.microsoft.com/office/drawing/2014/main" id="{FC677BBC-F3BB-654C-8462-852E7CD00AC0}"/>
+              </a:ext>
+            </a:extLst>
+          </p:cNvPr>
+          <p:cNvSpPr>
+            <a:spLocks noGrp="1"/>
+          </p:cNvSpPr>
+          <p:nvPr>
+            <p:ph type="title"/>
+          </p:nvPr>
+        </p:nvSpPr>
+        <p:spPr/>
+        <p:txBody>
+          <a:bodyPr/>
+          <a:lstStyle/>
+          <a:p>
+            <a:r>
+              <a:rPr lang="fr-FR" dirty="0"/>
+              <a:t>Objectifs de l’application mobile</a:t>
+            </a:r>
+          </a:p>
+        </p:txBody>
+      </p:sp>
+      <p:sp>
+        <p:nvSpPr>
+          <p:cNvPr id="3" name="Espace réservé du contenu 2">
+            <a:extLst>
+              <a:ext uri="{FF2B5EF4-FFF2-40B4-BE49-F238E27FC236}">
+                <a16:creationId xmlns:a16="http://schemas.microsoft.com/office/drawing/2014/main" id="{F11F9207-DA81-F94D-9D0C-70B259407CCF}"/>
+              </a:ext>
+            </a:extLst>
+          </p:cNvPr>
+          <p:cNvSpPr>
+            <a:spLocks noGrp="1"/>
+          </p:cNvSpPr>
+          <p:nvPr>
+            <p:ph idx="1"/>
+          </p:nvPr>
+        </p:nvSpPr>
+        <p:spPr/>
+        <p:txBody>
+          <a:bodyPr/>
+          <a:lstStyle/>
+          <a:p>
+            <a:r>
+              <a:rPr lang="fr-FR" dirty="0"/>
+              <a:t>Ajouter et retirer un vin</a:t>
+            </a:r>
+          </a:p>
+          <a:p>
+            <a:r>
+              <a:rPr lang="fr-FR" dirty="0"/>
+              <a:t>Faire des inventaires </a:t>
+            </a:r>
+          </a:p>
+          <a:p>
+            <a:r>
+              <a:rPr lang="fr-FR" dirty="0"/>
+              <a:t>Scanner des QR Code</a:t>
+            </a:r>
+          </a:p>
+          <a:p>
+            <a:r>
+              <a:rPr lang="fr-FR" dirty="0"/>
+              <a:t>Fonctionner sans connexion </a:t>
+            </a:r>
+          </a:p>
+        </p:txBody>
+      </p:sp>
+    </p:spTree>
+    <p:extLst>
+      <p:ext uri="{BB962C8B-B14F-4D97-AF65-F5344CB8AC3E}">
+        <p14:creationId xmlns:p14="http://schemas.microsoft.com/office/powerpoint/2010/main" val="1011802760"/>
+      </p:ext>
+    </p:extLst>
+  </p:cSld>
+  <p:clrMapOvr>
+    <a:masterClrMapping/>
+  </p:clrMapOvr>
+</p:sld>
+</file>
+
+<file path=ppt/slides/slide8.xml><?xml version="1.0" encoding="utf-8"?>
+<p:sld xmlns:a="http://schemas.openxmlformats.org/drawingml/2006/main" xmlns:r="http://schemas.openxmlformats.org/officeDocument/2006/relationships" xmlns:p="http://schemas.openxmlformats.org/presentationml/2006/main">
+  <p:cSld>
+    <p:spTree>
+      <p:nvGrpSpPr>
+        <p:cNvPr id="1" name=""/>
+        <p:cNvGrpSpPr/>
+        <p:nvPr/>
+      </p:nvGrpSpPr>
+      <p:grpSpPr>
+        <a:xfrm>
+          <a:off x="0" y="0"/>
+          <a:ext cx="0" cy="0"/>
+          <a:chOff x="0" y="0"/>
+          <a:chExt cx="0" cy="0"/>
+        </a:xfrm>
+      </p:grpSpPr>
+      <p:sp>
+        <p:nvSpPr>
+          <p:cNvPr id="2" name="Titre 1">
+            <a:extLst>
+              <a:ext uri="{FF2B5EF4-FFF2-40B4-BE49-F238E27FC236}">
+                <a16:creationId xmlns:a16="http://schemas.microsoft.com/office/drawing/2014/main" id="{E070BD1A-F734-004D-8050-6B841AA1C839}"/>
+              </a:ext>
+            </a:extLst>
+          </p:cNvPr>
+          <p:cNvSpPr>
+            <a:spLocks noGrp="1"/>
+          </p:cNvSpPr>
+          <p:nvPr>
+            <p:ph type="title"/>
+          </p:nvPr>
+        </p:nvSpPr>
+        <p:spPr/>
+        <p:txBody>
+          <a:bodyPr/>
+          <a:lstStyle/>
+          <a:p>
+            <a:r>
+              <a:rPr lang="fr-FR" dirty="0"/>
+              <a:t>Déroulement</a:t>
+            </a:r>
+          </a:p>
+        </p:txBody>
+      </p:sp>
+      <p:sp>
+        <p:nvSpPr>
+          <p:cNvPr id="4" name="Rectangle à coins arrondis 3">
+            <a:extLst>
+              <a:ext uri="{FF2B5EF4-FFF2-40B4-BE49-F238E27FC236}">
+                <a16:creationId xmlns:a16="http://schemas.microsoft.com/office/drawing/2014/main" id="{5B325F03-6E49-054A-905C-229B8AB7FA24}"/>
+              </a:ext>
+            </a:extLst>
+          </p:cNvPr>
+          <p:cNvSpPr/>
+          <p:nvPr/>
+        </p:nvSpPr>
+        <p:spPr>
+          <a:xfrm>
+            <a:off x="663448" y="2675868"/>
+            <a:ext cx="2966443" cy="2265587"/>
+          </a:xfrm>
+          <a:prstGeom prst="roundRect">
+            <a:avLst/>
+          </a:prstGeom>
+        </p:spPr>
+        <p:style>
+          <a:lnRef idx="2">
+            <a:schemeClr val="dk1">
+              <a:shade val="50000"/>
+            </a:schemeClr>
+          </a:lnRef>
+          <a:fillRef idx="1">
+            <a:schemeClr val="dk1"/>
+          </a:fillRef>
+          <a:effectRef idx="0">
+            <a:schemeClr val="dk1"/>
+          </a:effectRef>
+          <a:fontRef idx="minor">
+            <a:schemeClr val="lt1"/>
+          </a:fontRef>
+        </p:style>
+        <p:txBody>
+          <a:bodyPr rtlCol="0" anchor="ctr"/>
+          <a:lstStyle/>
+          <a:p>
+            <a:pPr algn="ctr"/>
+            <a:r>
+              <a:rPr lang="fr-FR" dirty="0"/>
+              <a:t>Introduction</a:t>
+            </a:r>
+          </a:p>
+        </p:txBody>
+      </p:sp>
+      <p:sp>
+        <p:nvSpPr>
+          <p:cNvPr id="5" name="Rectangle à coins arrondis 4">
+            <a:extLst>
+              <a:ext uri="{FF2B5EF4-FFF2-40B4-BE49-F238E27FC236}">
+                <a16:creationId xmlns:a16="http://schemas.microsoft.com/office/drawing/2014/main" id="{455A8A4E-9290-E748-98D6-FAD839D8E76B}"/>
+              </a:ext>
+            </a:extLst>
+          </p:cNvPr>
+          <p:cNvSpPr/>
+          <p:nvPr/>
+        </p:nvSpPr>
+        <p:spPr>
+          <a:xfrm>
+            <a:off x="4607375" y="2675867"/>
+            <a:ext cx="2966443" cy="2265587"/>
+          </a:xfrm>
+          <a:prstGeom prst="roundRect">
+            <a:avLst/>
+          </a:prstGeom>
+        </p:spPr>
+        <p:style>
+          <a:lnRef idx="2">
+            <a:schemeClr val="accent1">
+              <a:shade val="50000"/>
+            </a:schemeClr>
+          </a:lnRef>
+          <a:fillRef idx="1">
+            <a:schemeClr val="accent1"/>
+          </a:fillRef>
+          <a:effectRef idx="0">
+            <a:schemeClr val="accent1"/>
+          </a:effectRef>
+          <a:fontRef idx="minor">
+            <a:schemeClr val="lt1"/>
+          </a:fontRef>
+        </p:style>
+        <p:txBody>
+          <a:bodyPr rtlCol="0" anchor="ctr"/>
+          <a:lstStyle/>
+          <a:p>
+            <a:pPr algn="ctr"/>
+            <a:r>
+              <a:rPr lang="fr-FR" dirty="0"/>
+              <a:t>Développement</a:t>
+            </a:r>
+          </a:p>
+        </p:txBody>
+      </p:sp>
+      <p:sp>
+        <p:nvSpPr>
+          <p:cNvPr id="6" name="Rectangle à coins arrondis 5">
+            <a:extLst>
+              <a:ext uri="{FF2B5EF4-FFF2-40B4-BE49-F238E27FC236}">
+                <a16:creationId xmlns:a16="http://schemas.microsoft.com/office/drawing/2014/main" id="{67A4D9A3-B83A-DF4A-9E34-A0EE7F640B95}"/>
+              </a:ext>
+            </a:extLst>
+          </p:cNvPr>
+          <p:cNvSpPr/>
+          <p:nvPr/>
+        </p:nvSpPr>
+        <p:spPr>
+          <a:xfrm>
+            <a:off x="8551303" y="2675868"/>
+            <a:ext cx="2966443" cy="2265587"/>
+          </a:xfrm>
+          <a:prstGeom prst="roundRect">
+            <a:avLst/>
+          </a:prstGeom>
+        </p:spPr>
+        <p:style>
+          <a:lnRef idx="2">
+            <a:schemeClr val="dk1">
+              <a:shade val="50000"/>
+            </a:schemeClr>
+          </a:lnRef>
+          <a:fillRef idx="1">
+            <a:schemeClr val="dk1"/>
+          </a:fillRef>
+          <a:effectRef idx="0">
+            <a:schemeClr val="dk1"/>
+          </a:effectRef>
+          <a:fontRef idx="minor">
+            <a:schemeClr val="lt1"/>
+          </a:fontRef>
+        </p:style>
+        <p:txBody>
+          <a:bodyPr rtlCol="0" anchor="ctr"/>
+          <a:lstStyle/>
+          <a:p>
+            <a:pPr algn="ctr"/>
+            <a:r>
+              <a:rPr lang="fr-FR" dirty="0"/>
+              <a:t>Conclusion</a:t>
+            </a:r>
+          </a:p>
+        </p:txBody>
+      </p:sp>
+    </p:spTree>
+    <p:extLst>
+      <p:ext uri="{BB962C8B-B14F-4D97-AF65-F5344CB8AC3E}">
+        <p14:creationId xmlns:p14="http://schemas.microsoft.com/office/powerpoint/2010/main" val="1376849191"/>
+      </p:ext>
+    </p:extLst>
+  </p:cSld>
+  <p:clrMapOvr>
+    <a:masterClrMapping/>
+  </p:clrMapOvr>
+</p:sld>
+</file>
+
+<file path=ppt/slides/slide9.xml><?xml version="1.0" encoding="utf-8"?>
+<p:sld xmlns:a="http://schemas.openxmlformats.org/drawingml/2006/main" xmlns:r="http://schemas.openxmlformats.org/officeDocument/2006/relationships" xmlns:p="http://schemas.openxmlformats.org/presentationml/2006/main">
+  <p:cSld>
+    <p:spTree>
+      <p:nvGrpSpPr>
+        <p:cNvPr id="1" name=""/>
+        <p:cNvGrpSpPr/>
+        <p:nvPr/>
+      </p:nvGrpSpPr>
+      <p:grpSpPr>
+        <a:xfrm>
+          <a:off x="0" y="0"/>
+          <a:ext cx="0" cy="0"/>
+          <a:chOff x="0" y="0"/>
+          <a:chExt cx="0" cy="0"/>
+        </a:xfrm>
+      </p:grpSpPr>
+      <p:sp>
+        <p:nvSpPr>
+          <p:cNvPr id="2" name="Titre 1">
+            <a:extLst>
+              <a:ext uri="{FF2B5EF4-FFF2-40B4-BE49-F238E27FC236}">
+                <a16:creationId xmlns:a16="http://schemas.microsoft.com/office/drawing/2014/main" id="{8291E58B-1C17-7F4A-812A-153FC31E9A54}"/>
+              </a:ext>
+            </a:extLst>
+          </p:cNvPr>
+          <p:cNvSpPr>
+            <a:spLocks noGrp="1"/>
+          </p:cNvSpPr>
+          <p:nvPr>
+            <p:ph type="title"/>
+          </p:nvPr>
+        </p:nvSpPr>
+        <p:spPr/>
+        <p:txBody>
+          <a:bodyPr/>
+          <a:lstStyle/>
+          <a:p>
+            <a:r>
+              <a:rPr lang="fr-FR" dirty="0"/>
+              <a:t>Mise en production </a:t>
+            </a:r>
+          </a:p>
+        </p:txBody>
+      </p:sp>
+      <p:sp>
+        <p:nvSpPr>
+          <p:cNvPr id="3" name="Espace réservé du contenu 2">
+            <a:extLst>
+              <a:ext uri="{FF2B5EF4-FFF2-40B4-BE49-F238E27FC236}">
+                <a16:creationId xmlns:a16="http://schemas.microsoft.com/office/drawing/2014/main" id="{62C846C1-C67B-364F-B695-0D4C539580A7}"/>
+              </a:ext>
+            </a:extLst>
+          </p:cNvPr>
+          <p:cNvSpPr>
+            <a:spLocks noGrp="1"/>
+          </p:cNvSpPr>
+          <p:nvPr>
+            <p:ph idx="1"/>
+          </p:nvPr>
+        </p:nvSpPr>
+        <p:spPr/>
+        <p:txBody>
+          <a:bodyPr/>
+          <a:lstStyle/>
+          <a:p>
+            <a:r>
+              <a:rPr lang="fr-FR" dirty="0"/>
+              <a:t>Ce qui était convenu avec le client c’est qu’on ne devait pas gérer les logins sur le site, vu qu’ils ont déjà un système de login sur le site. </a:t>
+            </a:r>
+          </a:p>
+          <a:p>
+            <a:r>
+              <a:rPr lang="fr-FR" dirty="0"/>
+              <a:t>Vu que le webmaster n’était pas au courant de ça j’ai créé une protection avec un fichier .</a:t>
+            </a:r>
+            <a:r>
+              <a:rPr lang="fr-FR" dirty="0" err="1"/>
+              <a:t>htaccess</a:t>
+            </a:r>
+            <a:r>
+              <a:rPr lang="fr-FR" dirty="0"/>
+              <a:t> qui demande un login + </a:t>
+            </a:r>
+            <a:r>
+              <a:rPr lang="fr-FR" dirty="0" err="1"/>
+              <a:t>mdp</a:t>
+            </a:r>
+            <a:r>
+              <a:rPr lang="fr-FR" dirty="0"/>
+              <a:t> qui sont stockés dans le fichier .</a:t>
+            </a:r>
+            <a:r>
+              <a:rPr lang="fr-FR" dirty="0" err="1"/>
+              <a:t>htpassword</a:t>
+            </a:r>
+            <a:r>
+              <a:rPr lang="fr-FR" dirty="0"/>
+              <a:t> lorsqu’on arrive sur ma partie du site.</a:t>
+            </a:r>
+          </a:p>
+        </p:txBody>
+      </p:sp>
+      <p:sp>
+        <p:nvSpPr>
+          <p:cNvPr id="4" name="ZoneTexte 3">
+            <a:extLst>
+              <a:ext uri="{FF2B5EF4-FFF2-40B4-BE49-F238E27FC236}">
+                <a16:creationId xmlns:a16="http://schemas.microsoft.com/office/drawing/2014/main" id="{3D95E02C-40C9-E14E-981E-D63D89649598}"/>
+              </a:ext>
+            </a:extLst>
+          </p:cNvPr>
+          <p:cNvSpPr txBox="1"/>
+          <p:nvPr/>
+        </p:nvSpPr>
+        <p:spPr>
+          <a:xfrm>
+            <a:off x="11480799" y="6289963"/>
+            <a:ext cx="320922" cy="369332"/>
+          </a:xfrm>
+          <a:prstGeom prst="rect">
+            <a:avLst/>
+          </a:prstGeom>
+          <a:noFill/>
+        </p:spPr>
+        <p:txBody>
+          <a:bodyPr wrap="none" rtlCol="0">
+            <a:spAutoFit/>
+          </a:bodyPr>
+          <a:lstStyle/>
+          <a:p>
+            <a:r>
+              <a:rPr lang="fr-FR" dirty="0"/>
+              <a:t>4</a:t>
+            </a:r>
+          </a:p>
+        </p:txBody>
+      </p:sp>
+    </p:spTree>
+    <p:extLst>
+      <p:ext uri="{BB962C8B-B14F-4D97-AF65-F5344CB8AC3E}">
+        <p14:creationId xmlns:p14="http://schemas.microsoft.com/office/powerpoint/2010/main" val="1776768230"/>
       </p:ext>
     </p:extLst>
   </p:cSld>

</xml_diff>